<commit_message>
Slides R1 minor fixes
</commit_message>
<xml_diff>
--- a/Slides.pptx
+++ b/Slides.pptx
@@ -5,7 +5,7 @@
     <p:sldMasterId id="2147483648" r:id="rId1"/>
   </p:sldMasterIdLst>
   <p:notesMasterIdLst>
-    <p:notesMasterId r:id="rId18"/>
+    <p:notesMasterId r:id="rId19"/>
   </p:notesMasterIdLst>
   <p:sldIdLst>
     <p:sldId id="256" r:id="rId2"/>
@@ -20,10 +20,11 @@
     <p:sldId id="270" r:id="rId11"/>
     <p:sldId id="272" r:id="rId12"/>
     <p:sldId id="271" r:id="rId13"/>
-    <p:sldId id="273" r:id="rId14"/>
-    <p:sldId id="274" r:id="rId15"/>
-    <p:sldId id="275" r:id="rId16"/>
-    <p:sldId id="276" r:id="rId17"/>
+    <p:sldId id="277" r:id="rId14"/>
+    <p:sldId id="273" r:id="rId15"/>
+    <p:sldId id="274" r:id="rId16"/>
+    <p:sldId id="275" r:id="rId17"/>
+    <p:sldId id="276" r:id="rId18"/>
   </p:sldIdLst>
   <p:sldSz cx="12192000" cy="6858000"/>
   <p:notesSz cx="6858000" cy="9144000"/>
@@ -139,6 +140,7 @@
             <p14:sldId id="270"/>
             <p14:sldId id="272"/>
             <p14:sldId id="271"/>
+            <p14:sldId id="277"/>
             <p14:sldId id="273"/>
             <p14:sldId id="274"/>
             <p14:sldId id="275"/>
@@ -146,6 +148,9 @@
           </p14:sldIdLst>
         </p14:section>
       </p14:sectionLst>
+    </p:ext>
+    <p:ext uri="{EFAFB233-063F-42B5-8137-9DF3F51BA10A}">
+      <p15:sldGuideLst xmlns:p15="http://schemas.microsoft.com/office/powerpoint/2012/main"/>
     </p:ext>
   </p:extLst>
 </p:presentation>
@@ -4571,8 +4576,8 @@
           </a:p>
         </p:txBody>
       </p:sp>
-      <mc:AlternateContent xmlns:mc="http://schemas.openxmlformats.org/markup-compatibility/2006">
-        <mc:Choice xmlns:a14="http://schemas.microsoft.com/office/drawing/2010/main" Requires="a14">
+      <mc:AlternateContent xmlns:mc="http://schemas.openxmlformats.org/markup-compatibility/2006" xmlns:a14="http://schemas.microsoft.com/office/drawing/2010/main">
+        <mc:Choice Requires="a14">
           <p:sp>
             <p:nvSpPr>
               <p:cNvPr id="5" name="TextBox 4">
@@ -4687,7 +4692,7 @@
             </p:txBody>
           </p:sp>
         </mc:Choice>
-        <mc:Fallback>
+        <mc:Fallback xmlns="">
           <p:sp>
             <p:nvSpPr>
               <p:cNvPr id="5" name="TextBox 4">
@@ -4854,6 +4859,11 @@
                 </a:pPr>
                 <a:r>
                   <a:rPr lang="en-GB" sz="1800" dirty="0">
+                    <a:solidFill>
+                      <a:schemeClr val="bg1">
+                        <a:lumMod val="50000"/>
+                      </a:schemeClr>
+                    </a:solidFill>
                     <a:latin typeface="Palatino" pitchFamily="2" charset="77"/>
                     <a:ea typeface="Palatino" pitchFamily="2" charset="77"/>
                   </a:rPr>
@@ -4868,6 +4878,11 @@
                 </a:pPr>
                 <a:r>
                   <a:rPr lang="en-GB" sz="1800" dirty="0">
+                    <a:solidFill>
+                      <a:schemeClr val="bg1">
+                        <a:lumMod val="50000"/>
+                      </a:schemeClr>
+                    </a:solidFill>
                     <a:latin typeface="Palatino" pitchFamily="2" charset="77"/>
                     <a:ea typeface="Palatino" pitchFamily="2" charset="77"/>
                   </a:rPr>
@@ -4907,6 +4922,11 @@
                 </a:pPr>
                 <a:r>
                   <a:rPr lang="en-GB" sz="1800" dirty="0">
+                    <a:solidFill>
+                      <a:schemeClr val="bg1">
+                        <a:lumMod val="50000"/>
+                      </a:schemeClr>
+                    </a:solidFill>
                     <a:latin typeface="Palatino" pitchFamily="2" charset="77"/>
                     <a:ea typeface="Palatino" pitchFamily="2" charset="77"/>
                   </a:rPr>
@@ -4914,6 +4934,11 @@
                 </a:r>
                 <a:r>
                   <a:rPr lang="el-GR" sz="1800" dirty="0">
+                    <a:solidFill>
+                      <a:schemeClr val="bg1">
+                        <a:lumMod val="50000"/>
+                      </a:schemeClr>
+                    </a:solidFill>
                     <a:latin typeface="Palatino" pitchFamily="2" charset="77"/>
                     <a:ea typeface="Palatino" pitchFamily="2" charset="77"/>
                   </a:rPr>
@@ -4921,6 +4946,11 @@
                 </a:r>
                 <a:r>
                   <a:rPr lang="en-GB" sz="1800" dirty="0">
+                    <a:solidFill>
+                      <a:schemeClr val="bg1">
+                        <a:lumMod val="50000"/>
+                      </a:schemeClr>
+                    </a:solidFill>
                     <a:latin typeface="Palatino" pitchFamily="2" charset="77"/>
                     <a:ea typeface="Palatino" pitchFamily="2" charset="77"/>
                   </a:rPr>
@@ -4935,6 +4965,11 @@
                 </a:pPr>
                 <a:r>
                   <a:rPr lang="en-GB" sz="1800" dirty="0">
+                    <a:solidFill>
+                      <a:schemeClr val="bg1">
+                        <a:lumMod val="50000"/>
+                      </a:schemeClr>
+                    </a:solidFill>
                     <a:latin typeface="Palatino" pitchFamily="2" charset="77"/>
                     <a:ea typeface="Palatino" pitchFamily="2" charset="77"/>
                   </a:rPr>
@@ -4942,6 +4977,11 @@
                 </a:r>
                 <a:r>
                   <a:rPr lang="en-GB" sz="1800" i="1" dirty="0">
+                    <a:solidFill>
+                      <a:schemeClr val="bg1">
+                        <a:lumMod val="50000"/>
+                      </a:schemeClr>
+                    </a:solidFill>
                     <a:latin typeface="Palatino" pitchFamily="2" charset="77"/>
                     <a:ea typeface="Palatino" pitchFamily="2" charset="77"/>
                   </a:rPr>
@@ -4949,6 +4989,11 @@
                 </a:r>
                 <a:r>
                   <a:rPr lang="en-GB" sz="1800" dirty="0">
+                    <a:solidFill>
+                      <a:schemeClr val="bg1">
+                        <a:lumMod val="50000"/>
+                      </a:schemeClr>
+                    </a:solidFill>
                     <a:latin typeface="Palatino" pitchFamily="2" charset="77"/>
                     <a:ea typeface="Palatino" pitchFamily="2" charset="77"/>
                   </a:rPr>
@@ -4958,6 +5003,11 @@
                   <m:oMath xmlns:m="http://schemas.openxmlformats.org/officeDocument/2006/math">
                     <m:r>
                       <a:rPr lang="en-GB" sz="1800" i="1" smtClean="0">
+                        <a:solidFill>
+                          <a:schemeClr val="bg1">
+                            <a:lumMod val="50000"/>
+                          </a:schemeClr>
+                        </a:solidFill>
                         <a:latin typeface="Cambria Math" panose="02040503050406030204" pitchFamily="18" charset="0"/>
                         <a:ea typeface="Cambria Math" panose="02040503050406030204" pitchFamily="18" charset="0"/>
                       </a:rPr>
@@ -4967,6 +5017,11 @@
                 </a14:m>
                 <a:r>
                   <a:rPr lang="it-IT" sz="1800" dirty="0">
+                    <a:solidFill>
+                      <a:schemeClr val="bg1">
+                        <a:lumMod val="50000"/>
+                      </a:schemeClr>
+                    </a:solidFill>
                     <a:latin typeface="Palatino" pitchFamily="2" charset="77"/>
                     <a:ea typeface="Palatino" pitchFamily="2" charset="77"/>
                   </a:rPr>
@@ -4974,6 +5029,11 @@
                 </a:r>
                 <a:r>
                   <a:rPr lang="el-GR" sz="1800" dirty="0">
+                    <a:solidFill>
+                      <a:schemeClr val="bg1">
+                        <a:lumMod val="50000"/>
+                      </a:schemeClr>
+                    </a:solidFill>
                     <a:latin typeface="Palatino" pitchFamily="2" charset="77"/>
                     <a:ea typeface="Palatino" pitchFamily="2" charset="77"/>
                   </a:rPr>
@@ -4981,6 +5041,11 @@
                 </a:r>
                 <a:r>
                   <a:rPr lang="en-GB" sz="1800" dirty="0">
+                    <a:solidFill>
+                      <a:schemeClr val="bg1">
+                        <a:lumMod val="50000"/>
+                      </a:schemeClr>
+                    </a:solidFill>
                     <a:latin typeface="Palatino" pitchFamily="2" charset="77"/>
                     <a:ea typeface="Palatino" pitchFamily="2" charset="77"/>
                   </a:rPr>
@@ -4995,6 +5060,11 @@
                 </a:pPr>
                 <a:r>
                   <a:rPr lang="en-GB" sz="1800" dirty="0">
+                    <a:solidFill>
+                      <a:schemeClr val="bg1">
+                        <a:lumMod val="50000"/>
+                      </a:schemeClr>
+                    </a:solidFill>
                     <a:latin typeface="Palatino" pitchFamily="2" charset="77"/>
                     <a:ea typeface="Palatino" pitchFamily="2" charset="77"/>
                   </a:rPr>
@@ -5009,6 +5079,11 @@
                 </a:pPr>
                 <a:r>
                   <a:rPr lang="en-GB" sz="1800" dirty="0">
+                    <a:solidFill>
+                      <a:schemeClr val="bg1">
+                        <a:lumMod val="50000"/>
+                      </a:schemeClr>
+                    </a:solidFill>
                     <a:latin typeface="Palatino" pitchFamily="2" charset="77"/>
                     <a:ea typeface="Palatino" pitchFamily="2" charset="77"/>
                   </a:rPr>
@@ -5103,6 +5178,163 @@
         <p:cNvPr id="1" name="">
           <a:extLst>
             <a:ext uri="{FF2B5EF4-FFF2-40B4-BE49-F238E27FC236}">
+              <a16:creationId xmlns:a16="http://schemas.microsoft.com/office/drawing/2014/main" id="{C8D536DA-EB01-F32B-886A-54945DCA5ACE}"/>
+            </a:ext>
+          </a:extLst>
+        </p:cNvPr>
+        <p:cNvGrpSpPr/>
+        <p:nvPr/>
+      </p:nvGrpSpPr>
+      <p:grpSpPr>
+        <a:xfrm>
+          <a:off x="0" y="0"/>
+          <a:ext cx="0" cy="0"/>
+          <a:chOff x="0" y="0"/>
+          <a:chExt cx="0" cy="0"/>
+        </a:xfrm>
+      </p:grpSpPr>
+      <p:sp>
+        <p:nvSpPr>
+          <p:cNvPr id="2" name="Title 1">
+            <a:extLst>
+              <a:ext uri="{FF2B5EF4-FFF2-40B4-BE49-F238E27FC236}">
+                <a16:creationId xmlns:a16="http://schemas.microsoft.com/office/drawing/2014/main" id="{03192B38-8BAD-F96E-3689-2D991E896A9D}"/>
+              </a:ext>
+            </a:extLst>
+          </p:cNvPr>
+          <p:cNvSpPr>
+            <a:spLocks noGrp="1"/>
+          </p:cNvSpPr>
+          <p:nvPr>
+            <p:ph type="title"/>
+          </p:nvPr>
+        </p:nvSpPr>
+        <p:spPr/>
+        <p:txBody>
+          <a:bodyPr/>
+          <a:lstStyle/>
+          <a:p>
+            <a:r>
+              <a:rPr lang="en-IT" dirty="0">
+                <a:latin typeface="Palatino" pitchFamily="2" charset="77"/>
+                <a:ea typeface="Palatino" pitchFamily="2" charset="77"/>
+              </a:rPr>
+              <a:t>Strategy</a:t>
+            </a:r>
+          </a:p>
+        </p:txBody>
+      </p:sp>
+      <p:sp>
+        <p:nvSpPr>
+          <p:cNvPr id="3" name="Content Placeholder 2">
+            <a:extLst>
+              <a:ext uri="{FF2B5EF4-FFF2-40B4-BE49-F238E27FC236}">
+                <a16:creationId xmlns:a16="http://schemas.microsoft.com/office/drawing/2014/main" id="{3E564E6F-68A6-E584-58A4-875959D8EC9A}"/>
+              </a:ext>
+            </a:extLst>
+          </p:cNvPr>
+          <p:cNvSpPr>
+            <a:spLocks noGrp="1"/>
+          </p:cNvSpPr>
+          <p:nvPr>
+            <p:ph idx="1"/>
+          </p:nvPr>
+        </p:nvSpPr>
+        <p:spPr>
+          <a:xfrm>
+            <a:off x="838200" y="1668322"/>
+            <a:ext cx="8816163" cy="3254552"/>
+          </a:xfrm>
+        </p:spPr>
+        <p:txBody>
+          <a:bodyPr>
+            <a:noAutofit/>
+          </a:bodyPr>
+          <a:lstStyle/>
+          <a:p>
+            <a:pPr marL="0" indent="0">
+              <a:spcBef>
+                <a:spcPts val="0"/>
+              </a:spcBef>
+              <a:spcAft>
+                <a:spcPts val="1200"/>
+              </a:spcAft>
+              <a:buNone/>
+            </a:pPr>
+            <a:r>
+              <a:rPr lang="it-IT" sz="2400" dirty="0">
+                <a:latin typeface="Palatino" pitchFamily="2" charset="77"/>
+                <a:ea typeface="Palatino" pitchFamily="2" charset="77"/>
+              </a:rPr>
+              <a:t>Idea</a:t>
+            </a:r>
+          </a:p>
+          <a:p>
+            <a:pPr marL="0" indent="0">
+              <a:buNone/>
+            </a:pPr>
+            <a:r>
+              <a:rPr lang="en-GB" sz="1800" dirty="0">
+                <a:solidFill>
+                  <a:schemeClr val="bg1">
+                    <a:lumMod val="50000"/>
+                  </a:schemeClr>
+                </a:solidFill>
+                <a:latin typeface="Palatino" pitchFamily="2" charset="77"/>
+                <a:ea typeface="Palatino" pitchFamily="2" charset="77"/>
+              </a:rPr>
+              <a:t>By incorporating lower confidence bounds on consumption, this UCB1 extension ensures that decisions are budget-aware, while being optimistic about overconsumption in order to promote exploration, and to avoid waste of budget.</a:t>
+            </a:r>
+          </a:p>
+          <a:p>
+            <a:pPr marL="0" indent="0">
+              <a:buNone/>
+            </a:pPr>
+            <a:r>
+              <a:rPr lang="en-GB" sz="1800" dirty="0">
+                <a:solidFill>
+                  <a:schemeClr val="bg1">
+                    <a:lumMod val="50000"/>
+                  </a:schemeClr>
+                </a:solidFill>
+                <a:latin typeface="Palatino" pitchFamily="2" charset="77"/>
+                <a:ea typeface="Palatino" pitchFamily="2" charset="77"/>
+              </a:rPr>
+              <a:t>To do that, we allocate probability across arms through a linear programming problem, which avoids overconsumption (optimistically).</a:t>
+            </a:r>
+            <a:endParaRPr lang="en-IT" sz="1800" dirty="0">
+              <a:solidFill>
+                <a:schemeClr val="bg1">
+                  <a:lumMod val="50000"/>
+                </a:schemeClr>
+              </a:solidFill>
+              <a:latin typeface="Palatino" pitchFamily="2" charset="77"/>
+              <a:ea typeface="Palatino" pitchFamily="2" charset="77"/>
+            </a:endParaRPr>
+          </a:p>
+        </p:txBody>
+      </p:sp>
+    </p:spTree>
+    <p:extLst>
+      <p:ext uri="{BB962C8B-B14F-4D97-AF65-F5344CB8AC3E}">
+        <p14:creationId xmlns:p14="http://schemas.microsoft.com/office/powerpoint/2010/main" val="3372545420"/>
+      </p:ext>
+    </p:extLst>
+  </p:cSld>
+  <p:clrMapOvr>
+    <a:masterClrMapping/>
+  </p:clrMapOvr>
+</p:sld>
+</file>
+
+<file path=ppt/slides/slide14.xml><?xml version="1.0" encoding="utf-8"?>
+<p:sld xmlns:a="http://schemas.openxmlformats.org/drawingml/2006/main" xmlns:r="http://schemas.openxmlformats.org/officeDocument/2006/relationships" xmlns:p="http://schemas.openxmlformats.org/presentationml/2006/main">
+  <p:cSld>
+    <p:spTree>
+      <p:nvGrpSpPr>
+        <p:cNvPr id="1" name="">
+          <a:extLst>
+            <a:ext uri="{FF2B5EF4-FFF2-40B4-BE49-F238E27FC236}">
               <a16:creationId xmlns:a16="http://schemas.microsoft.com/office/drawing/2014/main" id="{63E8E159-16E0-2B81-8CEC-5EFA9B357D55}"/>
             </a:ext>
           </a:extLst>
@@ -5214,7 +5446,7 @@
                 <a:latin typeface="Palatino" pitchFamily="2" charset="77"/>
                 <a:ea typeface="Palatino" pitchFamily="2" charset="77"/>
               </a:rPr>
-              <a:t>The algorithm succesfully optimizes the usage per round.</a:t>
+              <a:t>The algorithm successfully optimizes the usage per round.</a:t>
             </a:r>
           </a:p>
         </p:txBody>
@@ -5263,7 +5495,7 @@
 </p:sld>
 </file>
 
-<file path=ppt/slides/slide14.xml><?xml version="1.0" encoding="utf-8"?>
+<file path=ppt/slides/slide15.xml><?xml version="1.0" encoding="utf-8"?>
 <p:sld xmlns:a="http://schemas.openxmlformats.org/drawingml/2006/main" xmlns:r="http://schemas.openxmlformats.org/officeDocument/2006/relationships" xmlns:p="http://schemas.openxmlformats.org/presentationml/2006/main">
   <p:cSld>
     <p:spTree>
@@ -5474,7 +5706,7 @@
 </p:sld>
 </file>
 
-<file path=ppt/slides/slide15.xml><?xml version="1.0" encoding="utf-8"?>
+<file path=ppt/slides/slide16.xml><?xml version="1.0" encoding="utf-8"?>
 <p:sld xmlns:a="http://schemas.openxmlformats.org/drawingml/2006/main" xmlns:r="http://schemas.openxmlformats.org/officeDocument/2006/relationships" xmlns:p="http://schemas.openxmlformats.org/presentationml/2006/main">
   <p:cSld>
     <p:spTree>
@@ -5719,7 +5951,7 @@
 </p:sld>
 </file>
 
-<file path=ppt/slides/slide16.xml><?xml version="1.0" encoding="utf-8"?>
+<file path=ppt/slides/slide17.xml><?xml version="1.0" encoding="utf-8"?>
 <p:sld xmlns:a="http://schemas.openxmlformats.org/drawingml/2006/main" xmlns:r="http://schemas.openxmlformats.org/officeDocument/2006/relationships" xmlns:p="http://schemas.openxmlformats.org/presentationml/2006/main">
   <p:cSld>
     <p:spTree>
@@ -6438,8 +6670,8 @@
           </a:p>
         </p:txBody>
       </p:sp>
-      <mc:AlternateContent xmlns:mc="http://schemas.openxmlformats.org/markup-compatibility/2006">
-        <mc:Choice xmlns:a14="http://schemas.microsoft.com/office/drawing/2010/main" Requires="a14">
+      <mc:AlternateContent xmlns:mc="http://schemas.openxmlformats.org/markup-compatibility/2006" xmlns:a14="http://schemas.microsoft.com/office/drawing/2010/main">
+        <mc:Choice Requires="a14">
           <p:sp>
             <p:nvSpPr>
               <p:cNvPr id="5" name="TextBox 4">
@@ -6929,7 +7161,7 @@
             </p:txBody>
           </p:sp>
         </mc:Choice>
-        <mc:Fallback>
+        <mc:Fallback xmlns="">
           <p:sp>
             <p:nvSpPr>
               <p:cNvPr id="5" name="TextBox 4">
@@ -7144,8 +7376,8 @@
           </a:p>
         </p:txBody>
       </p:sp>
-      <mc:AlternateContent xmlns:mc="http://schemas.openxmlformats.org/markup-compatibility/2006">
-        <mc:Choice xmlns:a14="http://schemas.microsoft.com/office/drawing/2010/main" Requires="a14">
+      <mc:AlternateContent xmlns:mc="http://schemas.openxmlformats.org/markup-compatibility/2006" xmlns:a14="http://schemas.microsoft.com/office/drawing/2010/main">
+        <mc:Choice Requires="a14">
           <p:sp>
             <p:nvSpPr>
               <p:cNvPr id="5" name="TextBox 4">
@@ -8150,7 +8382,7 @@
             </p:txBody>
           </p:sp>
         </mc:Choice>
-        <mc:Fallback>
+        <mc:Fallback xmlns="">
           <p:sp>
             <p:nvSpPr>
               <p:cNvPr id="5" name="TextBox 4">

</xml_diff>

<commit_message>
Fix R1 minor stuff
</commit_message>
<xml_diff>
--- a/Slides.pptx
+++ b/Slides.pptx
@@ -5,7 +5,7 @@
     <p:sldMasterId id="2147483648" r:id="rId1"/>
   </p:sldMasterIdLst>
   <p:notesMasterIdLst>
-    <p:notesMasterId r:id="rId19"/>
+    <p:notesMasterId r:id="rId27"/>
   </p:notesMasterIdLst>
   <p:sldIdLst>
     <p:sldId id="256" r:id="rId2"/>
@@ -25,6 +25,14 @@
     <p:sldId id="274" r:id="rId16"/>
     <p:sldId id="275" r:id="rId17"/>
     <p:sldId id="276" r:id="rId18"/>
+    <p:sldId id="278" r:id="rId19"/>
+    <p:sldId id="279" r:id="rId20"/>
+    <p:sldId id="282" r:id="rId21"/>
+    <p:sldId id="283" r:id="rId22"/>
+    <p:sldId id="280" r:id="rId23"/>
+    <p:sldId id="281" r:id="rId24"/>
+    <p:sldId id="284" r:id="rId25"/>
+    <p:sldId id="285" r:id="rId26"/>
   </p:sldIdLst>
   <p:sldSz cx="12192000" cy="6858000"/>
   <p:notesSz cx="6858000" cy="9144000"/>
@@ -145,6 +153,14 @@
             <p14:sldId id="274"/>
             <p14:sldId id="275"/>
             <p14:sldId id="276"/>
+            <p14:sldId id="278"/>
+            <p14:sldId id="279"/>
+            <p14:sldId id="282"/>
+            <p14:sldId id="283"/>
+            <p14:sldId id="280"/>
+            <p14:sldId id="281"/>
+            <p14:sldId id="284"/>
+            <p14:sldId id="285"/>
           </p14:sldIdLst>
         </p14:section>
       </p14:sectionLst>
@@ -1013,6 +1029,330 @@
     <p:extLst>
       <p:ext uri="{BB962C8B-B14F-4D97-AF65-F5344CB8AC3E}">
         <p14:creationId xmlns:p14="http://schemas.microsoft.com/office/powerpoint/2010/main" val="3429223711"/>
+      </p:ext>
+    </p:extLst>
+  </p:cSld>
+  <p:clrMapOvr>
+    <a:masterClrMapping/>
+  </p:clrMapOvr>
+</p:notes>
+</file>
+
+<file path=ppt/notesSlides/notesSlide6.xml><?xml version="1.0" encoding="utf-8"?>
+<p:notes xmlns:a="http://schemas.openxmlformats.org/drawingml/2006/main" xmlns:r="http://schemas.openxmlformats.org/officeDocument/2006/relationships" xmlns:p="http://schemas.openxmlformats.org/presentationml/2006/main">
+  <p:cSld>
+    <p:spTree>
+      <p:nvGrpSpPr>
+        <p:cNvPr id="1" name="">
+          <a:extLst>
+            <a:ext uri="{FF2B5EF4-FFF2-40B4-BE49-F238E27FC236}">
+              <a16:creationId xmlns:a16="http://schemas.microsoft.com/office/drawing/2014/main" id="{EC3BDF3C-F76D-BC65-3301-4FDC858A0547}"/>
+            </a:ext>
+          </a:extLst>
+        </p:cNvPr>
+        <p:cNvGrpSpPr/>
+        <p:nvPr/>
+      </p:nvGrpSpPr>
+      <p:grpSpPr>
+        <a:xfrm>
+          <a:off x="0" y="0"/>
+          <a:ext cx="0" cy="0"/>
+          <a:chOff x="0" y="0"/>
+          <a:chExt cx="0" cy="0"/>
+        </a:xfrm>
+      </p:grpSpPr>
+      <p:sp>
+        <p:nvSpPr>
+          <p:cNvPr id="2" name="Slide Image Placeholder 1">
+            <a:extLst>
+              <a:ext uri="{FF2B5EF4-FFF2-40B4-BE49-F238E27FC236}">
+                <a16:creationId xmlns:a16="http://schemas.microsoft.com/office/drawing/2014/main" id="{5DB9C22E-331F-7744-7AD5-62E7F951EB05}"/>
+              </a:ext>
+            </a:extLst>
+          </p:cNvPr>
+          <p:cNvSpPr>
+            <a:spLocks noGrp="1" noRot="1" noChangeAspect="1"/>
+          </p:cNvSpPr>
+          <p:nvPr>
+            <p:ph type="sldImg"/>
+          </p:nvPr>
+        </p:nvSpPr>
+        <p:spPr/>
+      </p:sp>
+      <p:sp>
+        <p:nvSpPr>
+          <p:cNvPr id="3" name="Notes Placeholder 2">
+            <a:extLst>
+              <a:ext uri="{FF2B5EF4-FFF2-40B4-BE49-F238E27FC236}">
+                <a16:creationId xmlns:a16="http://schemas.microsoft.com/office/drawing/2014/main" id="{6A381BB2-43E7-6550-70BF-375221070957}"/>
+              </a:ext>
+            </a:extLst>
+          </p:cNvPr>
+          <p:cNvSpPr>
+            <a:spLocks noGrp="1"/>
+          </p:cNvSpPr>
+          <p:nvPr>
+            <p:ph type="body" idx="1"/>
+          </p:nvPr>
+        </p:nvSpPr>
+        <p:spPr/>
+        <p:txBody>
+          <a:bodyPr/>
+          <a:lstStyle/>
+          <a:p>
+            <a:endParaRPr lang="en-IT" dirty="0"/>
+          </a:p>
+        </p:txBody>
+      </p:sp>
+      <p:sp>
+        <p:nvSpPr>
+          <p:cNvPr id="4" name="Slide Number Placeholder 3">
+            <a:extLst>
+              <a:ext uri="{FF2B5EF4-FFF2-40B4-BE49-F238E27FC236}">
+                <a16:creationId xmlns:a16="http://schemas.microsoft.com/office/drawing/2014/main" id="{DD13BF81-4FAA-9147-FA13-C0BA1EE03506}"/>
+              </a:ext>
+            </a:extLst>
+          </p:cNvPr>
+          <p:cNvSpPr>
+            <a:spLocks noGrp="1"/>
+          </p:cNvSpPr>
+          <p:nvPr>
+            <p:ph type="sldNum" sz="quarter" idx="5"/>
+          </p:nvPr>
+        </p:nvSpPr>
+        <p:spPr/>
+        <p:txBody>
+          <a:bodyPr/>
+          <a:lstStyle/>
+          <a:p>
+            <a:fld id="{4CF2BA9C-3F3B-B24C-BD51-7D1F2E3C25B9}" type="slidenum">
+              <a:rPr lang="en-IT" smtClean="0"/>
+              <a:t>19</a:t>
+            </a:fld>
+            <a:endParaRPr lang="en-IT"/>
+          </a:p>
+        </p:txBody>
+      </p:sp>
+    </p:spTree>
+    <p:extLst>
+      <p:ext uri="{BB962C8B-B14F-4D97-AF65-F5344CB8AC3E}">
+        <p14:creationId xmlns:p14="http://schemas.microsoft.com/office/powerpoint/2010/main" val="2472887512"/>
+      </p:ext>
+    </p:extLst>
+  </p:cSld>
+  <p:clrMapOvr>
+    <a:masterClrMapping/>
+  </p:clrMapOvr>
+</p:notes>
+</file>
+
+<file path=ppt/notesSlides/notesSlide7.xml><?xml version="1.0" encoding="utf-8"?>
+<p:notes xmlns:a="http://schemas.openxmlformats.org/drawingml/2006/main" xmlns:r="http://schemas.openxmlformats.org/officeDocument/2006/relationships" xmlns:p="http://schemas.openxmlformats.org/presentationml/2006/main">
+  <p:cSld>
+    <p:spTree>
+      <p:nvGrpSpPr>
+        <p:cNvPr id="1" name="">
+          <a:extLst>
+            <a:ext uri="{FF2B5EF4-FFF2-40B4-BE49-F238E27FC236}">
+              <a16:creationId xmlns:a16="http://schemas.microsoft.com/office/drawing/2014/main" id="{D2B66AF6-45FB-412A-9F54-E39B02400898}"/>
+            </a:ext>
+          </a:extLst>
+        </p:cNvPr>
+        <p:cNvGrpSpPr/>
+        <p:nvPr/>
+      </p:nvGrpSpPr>
+      <p:grpSpPr>
+        <a:xfrm>
+          <a:off x="0" y="0"/>
+          <a:ext cx="0" cy="0"/>
+          <a:chOff x="0" y="0"/>
+          <a:chExt cx="0" cy="0"/>
+        </a:xfrm>
+      </p:grpSpPr>
+      <p:sp>
+        <p:nvSpPr>
+          <p:cNvPr id="2" name="Slide Image Placeholder 1">
+            <a:extLst>
+              <a:ext uri="{FF2B5EF4-FFF2-40B4-BE49-F238E27FC236}">
+                <a16:creationId xmlns:a16="http://schemas.microsoft.com/office/drawing/2014/main" id="{61E1567F-3419-02FE-13CC-19D45ADBB9BA}"/>
+              </a:ext>
+            </a:extLst>
+          </p:cNvPr>
+          <p:cNvSpPr>
+            <a:spLocks noGrp="1" noRot="1" noChangeAspect="1"/>
+          </p:cNvSpPr>
+          <p:nvPr>
+            <p:ph type="sldImg"/>
+          </p:nvPr>
+        </p:nvSpPr>
+        <p:spPr/>
+      </p:sp>
+      <p:sp>
+        <p:nvSpPr>
+          <p:cNvPr id="3" name="Notes Placeholder 2">
+            <a:extLst>
+              <a:ext uri="{FF2B5EF4-FFF2-40B4-BE49-F238E27FC236}">
+                <a16:creationId xmlns:a16="http://schemas.microsoft.com/office/drawing/2014/main" id="{60791DF2-D1CE-5862-5AB3-E105BC22139A}"/>
+              </a:ext>
+            </a:extLst>
+          </p:cNvPr>
+          <p:cNvSpPr>
+            <a:spLocks noGrp="1"/>
+          </p:cNvSpPr>
+          <p:nvPr>
+            <p:ph type="body" idx="1"/>
+          </p:nvPr>
+        </p:nvSpPr>
+        <p:spPr/>
+        <p:txBody>
+          <a:bodyPr/>
+          <a:lstStyle/>
+          <a:p>
+            <a:endParaRPr lang="en-IT" dirty="0"/>
+          </a:p>
+        </p:txBody>
+      </p:sp>
+      <p:sp>
+        <p:nvSpPr>
+          <p:cNvPr id="4" name="Slide Number Placeholder 3">
+            <a:extLst>
+              <a:ext uri="{FF2B5EF4-FFF2-40B4-BE49-F238E27FC236}">
+                <a16:creationId xmlns:a16="http://schemas.microsoft.com/office/drawing/2014/main" id="{DA330CD6-E123-9C6D-4706-5721C55275C6}"/>
+              </a:ext>
+            </a:extLst>
+          </p:cNvPr>
+          <p:cNvSpPr>
+            <a:spLocks noGrp="1"/>
+          </p:cNvSpPr>
+          <p:nvPr>
+            <p:ph type="sldNum" sz="quarter" idx="5"/>
+          </p:nvPr>
+        </p:nvSpPr>
+        <p:spPr/>
+        <p:txBody>
+          <a:bodyPr/>
+          <a:lstStyle/>
+          <a:p>
+            <a:fld id="{4CF2BA9C-3F3B-B24C-BD51-7D1F2E3C25B9}" type="slidenum">
+              <a:rPr lang="en-IT" smtClean="0"/>
+              <a:t>22</a:t>
+            </a:fld>
+            <a:endParaRPr lang="en-IT"/>
+          </a:p>
+        </p:txBody>
+      </p:sp>
+    </p:spTree>
+    <p:extLst>
+      <p:ext uri="{BB962C8B-B14F-4D97-AF65-F5344CB8AC3E}">
+        <p14:creationId xmlns:p14="http://schemas.microsoft.com/office/powerpoint/2010/main" val="519827807"/>
+      </p:ext>
+    </p:extLst>
+  </p:cSld>
+  <p:clrMapOvr>
+    <a:masterClrMapping/>
+  </p:clrMapOvr>
+</p:notes>
+</file>
+
+<file path=ppt/notesSlides/notesSlide8.xml><?xml version="1.0" encoding="utf-8"?>
+<p:notes xmlns:a="http://schemas.openxmlformats.org/drawingml/2006/main" xmlns:r="http://schemas.openxmlformats.org/officeDocument/2006/relationships" xmlns:p="http://schemas.openxmlformats.org/presentationml/2006/main">
+  <p:cSld>
+    <p:spTree>
+      <p:nvGrpSpPr>
+        <p:cNvPr id="1" name="">
+          <a:extLst>
+            <a:ext uri="{FF2B5EF4-FFF2-40B4-BE49-F238E27FC236}">
+              <a16:creationId xmlns:a16="http://schemas.microsoft.com/office/drawing/2014/main" id="{5C1B3CC1-CDFB-ADCD-7B0E-BAA988448808}"/>
+            </a:ext>
+          </a:extLst>
+        </p:cNvPr>
+        <p:cNvGrpSpPr/>
+        <p:nvPr/>
+      </p:nvGrpSpPr>
+      <p:grpSpPr>
+        <a:xfrm>
+          <a:off x="0" y="0"/>
+          <a:ext cx="0" cy="0"/>
+          <a:chOff x="0" y="0"/>
+          <a:chExt cx="0" cy="0"/>
+        </a:xfrm>
+      </p:grpSpPr>
+      <p:sp>
+        <p:nvSpPr>
+          <p:cNvPr id="2" name="Slide Image Placeholder 1">
+            <a:extLst>
+              <a:ext uri="{FF2B5EF4-FFF2-40B4-BE49-F238E27FC236}">
+                <a16:creationId xmlns:a16="http://schemas.microsoft.com/office/drawing/2014/main" id="{7F5CB245-1905-FA31-E3B6-680A7E69D378}"/>
+              </a:ext>
+            </a:extLst>
+          </p:cNvPr>
+          <p:cNvSpPr>
+            <a:spLocks noGrp="1" noRot="1" noChangeAspect="1"/>
+          </p:cNvSpPr>
+          <p:nvPr>
+            <p:ph type="sldImg"/>
+          </p:nvPr>
+        </p:nvSpPr>
+        <p:spPr/>
+      </p:sp>
+      <p:sp>
+        <p:nvSpPr>
+          <p:cNvPr id="3" name="Notes Placeholder 2">
+            <a:extLst>
+              <a:ext uri="{FF2B5EF4-FFF2-40B4-BE49-F238E27FC236}">
+                <a16:creationId xmlns:a16="http://schemas.microsoft.com/office/drawing/2014/main" id="{C641FCFE-420C-14E8-BDAB-2E76D6AA6EFA}"/>
+              </a:ext>
+            </a:extLst>
+          </p:cNvPr>
+          <p:cNvSpPr>
+            <a:spLocks noGrp="1"/>
+          </p:cNvSpPr>
+          <p:nvPr>
+            <p:ph type="body" idx="1"/>
+          </p:nvPr>
+        </p:nvSpPr>
+        <p:spPr/>
+        <p:txBody>
+          <a:bodyPr/>
+          <a:lstStyle/>
+          <a:p>
+            <a:endParaRPr lang="en-IT" dirty="0"/>
+          </a:p>
+        </p:txBody>
+      </p:sp>
+      <p:sp>
+        <p:nvSpPr>
+          <p:cNvPr id="4" name="Slide Number Placeholder 3">
+            <a:extLst>
+              <a:ext uri="{FF2B5EF4-FFF2-40B4-BE49-F238E27FC236}">
+                <a16:creationId xmlns:a16="http://schemas.microsoft.com/office/drawing/2014/main" id="{203CEC38-502C-FCA3-BB6A-E0170283E208}"/>
+              </a:ext>
+            </a:extLst>
+          </p:cNvPr>
+          <p:cNvSpPr>
+            <a:spLocks noGrp="1"/>
+          </p:cNvSpPr>
+          <p:nvPr>
+            <p:ph type="sldNum" sz="quarter" idx="5"/>
+          </p:nvPr>
+        </p:nvSpPr>
+        <p:spPr/>
+        <p:txBody>
+          <a:bodyPr/>
+          <a:lstStyle/>
+          <a:p>
+            <a:fld id="{4CF2BA9C-3F3B-B24C-BD51-7D1F2E3C25B9}" type="slidenum">
+              <a:rPr lang="en-IT" smtClean="0"/>
+              <a:t>23</a:t>
+            </a:fld>
+            <a:endParaRPr lang="en-IT"/>
+          </a:p>
+        </p:txBody>
+      </p:sp>
+    </p:spTree>
+    <p:extLst>
+      <p:ext uri="{BB962C8B-B14F-4D97-AF65-F5344CB8AC3E}">
+        <p14:creationId xmlns:p14="http://schemas.microsoft.com/office/powerpoint/2010/main" val="3156021068"/>
       </p:ext>
     </p:extLst>
   </p:cSld>
@@ -4576,167 +4916,79 @@
           </a:p>
         </p:txBody>
       </p:sp>
-      <mc:AlternateContent xmlns:mc="http://schemas.openxmlformats.org/markup-compatibility/2006" xmlns:a14="http://schemas.microsoft.com/office/drawing/2010/main">
-        <mc:Choice Requires="a14">
-          <p:sp>
-            <p:nvSpPr>
-              <p:cNvPr id="5" name="TextBox 4">
-                <a:extLst>
-                  <a:ext uri="{FF2B5EF4-FFF2-40B4-BE49-F238E27FC236}">
-                    <a16:creationId xmlns:a16="http://schemas.microsoft.com/office/drawing/2014/main" id="{1E2F0BF0-8CA2-AE62-4E9C-DE83174BC147}"/>
-                  </a:ext>
-                </a:extLst>
-              </p:cNvPr>
-              <p:cNvSpPr txBox="1"/>
-              <p:nvPr/>
-            </p:nvSpPr>
-            <p:spPr>
-              <a:xfrm>
-                <a:off x="838200" y="1690688"/>
-                <a:ext cx="10786242" cy="892552"/>
-              </a:xfrm>
-              <a:prstGeom prst="rect">
-                <a:avLst/>
-              </a:prstGeom>
-              <a:noFill/>
-            </p:spPr>
-            <p:txBody>
-              <a:bodyPr wrap="square" rtlCol="0">
-                <a:spAutoFit/>
-              </a:bodyPr>
-              <a:lstStyle/>
-              <a:p>
-                <a:pPr>
-                  <a:spcAft>
-                    <a:spcPts val="1200"/>
-                  </a:spcAft>
-                </a:pPr>
-                <a:r>
-                  <a:rPr lang="en-IT" sz="2400" dirty="0">
-                    <a:latin typeface="Palatino" pitchFamily="2" charset="77"/>
-                    <a:ea typeface="Palatino" pitchFamily="2" charset="77"/>
-                  </a:rPr>
-                  <a:t>Parameters setting</a:t>
-                </a:r>
-                <a:endParaRPr lang="en-IT" sz="2000" dirty="0">
-                  <a:latin typeface="Palatino" pitchFamily="2" charset="77"/>
-                  <a:ea typeface="Palatino" pitchFamily="2" charset="77"/>
-                </a:endParaRPr>
-              </a:p>
-              <a:p>
-                <a:r>
-                  <a:rPr lang="it-IT" i="1" dirty="0">
-                    <a:solidFill>
-                      <a:schemeClr val="bg1">
-                        <a:lumMod val="50000"/>
-                      </a:schemeClr>
-                    </a:solidFill>
-                    <a:latin typeface="Palatino" pitchFamily="2" charset="77"/>
-                    <a:ea typeface="Palatino" pitchFamily="2" charset="77"/>
-                  </a:rPr>
-                  <a:t>B = </a:t>
-                </a:r>
-                <a:r>
-                  <a:rPr lang="en-GB" i="1" dirty="0">
-                    <a:solidFill>
-                      <a:schemeClr val="bg1">
-                        <a:lumMod val="50000"/>
-                      </a:schemeClr>
-                    </a:solidFill>
-                    <a:latin typeface="Palatino" pitchFamily="2" charset="77"/>
-                    <a:ea typeface="Palatino" pitchFamily="2" charset="77"/>
-                  </a:rPr>
-                  <a:t>120000 </a:t>
-                </a:r>
-                <a14:m>
-                  <m:oMath xmlns:m="http://schemas.openxmlformats.org/officeDocument/2006/math">
-                    <m:r>
-                      <a:rPr lang="en-GB" i="1" smtClean="0">
-                        <a:solidFill>
-                          <a:schemeClr val="bg1">
-                            <a:lumMod val="50000"/>
-                          </a:schemeClr>
-                        </a:solidFill>
-                        <a:latin typeface="Cambria Math" panose="02040503050406030204" pitchFamily="18" charset="0"/>
-                        <a:ea typeface="Cambria Math" panose="02040503050406030204" pitchFamily="18" charset="0"/>
-                      </a:rPr>
-                      <m:t>∙</m:t>
-                    </m:r>
-                    <m:r>
-                      <a:rPr lang="it-IT" b="0" i="1" smtClean="0">
-                        <a:solidFill>
-                          <a:schemeClr val="bg1">
-                            <a:lumMod val="50000"/>
-                          </a:schemeClr>
-                        </a:solidFill>
-                        <a:latin typeface="Cambria Math" panose="02040503050406030204" pitchFamily="18" charset="0"/>
-                        <a:ea typeface="Cambria Math" panose="02040503050406030204" pitchFamily="18" charset="0"/>
-                      </a:rPr>
-                      <m:t> </m:t>
-                    </m:r>
-                  </m:oMath>
-                </a14:m>
-                <a:r>
-                  <a:rPr lang="en-GB" i="1" dirty="0">
-                    <a:solidFill>
-                      <a:schemeClr val="bg1">
-                        <a:lumMod val="50000"/>
-                      </a:schemeClr>
-                    </a:solidFill>
-                    <a:latin typeface="Palatino" pitchFamily="2" charset="77"/>
-                    <a:ea typeface="Palatino" pitchFamily="2" charset="77"/>
-                  </a:rPr>
-                  <a:t>N</a:t>
-                </a:r>
-              </a:p>
-            </p:txBody>
-          </p:sp>
-        </mc:Choice>
-        <mc:Fallback xmlns="">
-          <p:sp>
-            <p:nvSpPr>
-              <p:cNvPr id="5" name="TextBox 4">
-                <a:extLst>
-                  <a:ext uri="{FF2B5EF4-FFF2-40B4-BE49-F238E27FC236}">
-                    <a16:creationId xmlns:a16="http://schemas.microsoft.com/office/drawing/2014/main" id="{1E2F0BF0-8CA2-AE62-4E9C-DE83174BC147}"/>
-                  </a:ext>
-                </a:extLst>
-              </p:cNvPr>
-              <p:cNvSpPr txBox="1">
-                <a:spLocks noRot="1" noChangeAspect="1" noMove="1" noResize="1" noEditPoints="1" noAdjustHandles="1" noChangeArrowheads="1" noChangeShapeType="1" noTextEdit="1"/>
-              </p:cNvSpPr>
-              <p:nvPr/>
-            </p:nvSpPr>
-            <p:spPr>
-              <a:xfrm>
-                <a:off x="838200" y="1690688"/>
-                <a:ext cx="10786242" cy="892552"/>
-              </a:xfrm>
-              <a:prstGeom prst="rect">
-                <a:avLst/>
-              </a:prstGeom>
-              <a:blipFill>
-                <a:blip r:embed="rId3"/>
-                <a:stretch>
-                  <a:fillRect l="-941" t="-4167" b="-8333"/>
-                </a:stretch>
-              </a:blipFill>
-            </p:spPr>
-            <p:txBody>
-              <a:bodyPr/>
-              <a:lstStyle/>
-              <a:p>
-                <a:r>
-                  <a:rPr lang="en-IT">
-                    <a:noFill/>
-                  </a:rPr>
-                  <a:t> </a:t>
-                </a:r>
-              </a:p>
-            </p:txBody>
-          </p:sp>
-        </mc:Fallback>
-      </mc:AlternateContent>
+      <p:sp>
+        <p:nvSpPr>
+          <p:cNvPr id="5" name="TextBox 4">
+            <a:extLst>
+              <a:ext uri="{FF2B5EF4-FFF2-40B4-BE49-F238E27FC236}">
+                <a16:creationId xmlns:a16="http://schemas.microsoft.com/office/drawing/2014/main" id="{1E2F0BF0-8CA2-AE62-4E9C-DE83174BC147}"/>
+              </a:ext>
+            </a:extLst>
+          </p:cNvPr>
+          <p:cNvSpPr txBox="1"/>
+          <p:nvPr/>
+        </p:nvSpPr>
+        <p:spPr>
+          <a:xfrm>
+            <a:off x="838200" y="1690688"/>
+            <a:ext cx="10786242" cy="892552"/>
+          </a:xfrm>
+          <a:prstGeom prst="rect">
+            <a:avLst/>
+          </a:prstGeom>
+          <a:noFill/>
+        </p:spPr>
+        <p:txBody>
+          <a:bodyPr wrap="square" rtlCol="0">
+            <a:spAutoFit/>
+          </a:bodyPr>
+          <a:lstStyle/>
+          <a:p>
+            <a:pPr>
+              <a:spcAft>
+                <a:spcPts val="1200"/>
+              </a:spcAft>
+            </a:pPr>
+            <a:r>
+              <a:rPr lang="en-IT" sz="2400" dirty="0">
+                <a:latin typeface="Palatino" pitchFamily="2" charset="77"/>
+                <a:ea typeface="Palatino" pitchFamily="2" charset="77"/>
+              </a:rPr>
+              <a:t>Parameters setting</a:t>
+            </a:r>
+            <a:endParaRPr lang="en-IT" sz="2000" dirty="0">
+              <a:latin typeface="Palatino" pitchFamily="2" charset="77"/>
+              <a:ea typeface="Palatino" pitchFamily="2" charset="77"/>
+            </a:endParaRPr>
+          </a:p>
+          <a:p>
+            <a:r>
+              <a:rPr lang="it-IT" i="1" dirty="0">
+                <a:solidFill>
+                  <a:schemeClr val="bg1">
+                    <a:lumMod val="50000"/>
+                  </a:schemeClr>
+                </a:solidFill>
+                <a:latin typeface="Palatino" pitchFamily="2" charset="77"/>
+                <a:ea typeface="Palatino" pitchFamily="2" charset="77"/>
+              </a:rPr>
+              <a:t>B = </a:t>
+            </a:r>
+            <a:r>
+              <a:rPr lang="en-GB" i="1" dirty="0">
+                <a:solidFill>
+                  <a:schemeClr val="bg1">
+                    <a:lumMod val="50000"/>
+                  </a:schemeClr>
+                </a:solidFill>
+                <a:latin typeface="Palatino" pitchFamily="2" charset="77"/>
+                <a:ea typeface="Palatino" pitchFamily="2" charset="77"/>
+              </a:rPr>
+              <a:t>120000</a:t>
+            </a:r>
+          </a:p>
+        </p:txBody>
+      </p:sp>
     </p:spTree>
     <p:extLst>
       <p:ext uri="{BB962C8B-B14F-4D97-AF65-F5344CB8AC3E}">
@@ -4804,8 +5056,8 @@
           </a:p>
         </p:txBody>
       </p:sp>
-      <mc:AlternateContent xmlns:mc="http://schemas.openxmlformats.org/markup-compatibility/2006">
-        <mc:Choice xmlns:a14="http://schemas.microsoft.com/office/drawing/2010/main" Requires="a14">
+      <mc:AlternateContent xmlns:mc="http://schemas.openxmlformats.org/markup-compatibility/2006" xmlns:a14="http://schemas.microsoft.com/office/drawing/2010/main">
+        <mc:Choice Requires="a14">
           <p:sp>
             <p:nvSpPr>
               <p:cNvPr id="3" name="Content Placeholder 2">
@@ -5113,7 +5365,7 @@
             </p:txBody>
           </p:sp>
         </mc:Choice>
-        <mc:Fallback>
+        <mc:Fallback xmlns="">
           <p:sp>
             <p:nvSpPr>
               <p:cNvPr id="3" name="Content Placeholder 2">
@@ -5283,7 +5535,7 @@
                 <a:latin typeface="Palatino" pitchFamily="2" charset="77"/>
                 <a:ea typeface="Palatino" pitchFamily="2" charset="77"/>
               </a:rPr>
-              <a:t>By incorporating lower confidence bounds on consumption, this UCB1 extension ensures that decisions are budget-aware, while being optimistic about overconsumption in order to promote exploration, and to avoid waste of budget.</a:t>
+              <a:t>By incorporating lower confidence bounds on consumption, this UCB1 extension ensures that decisions are budget-aware, while being optimistic about overconsumption in order to promote exploration, and to avoid waste of budget</a:t>
             </a:r>
           </a:p>
           <a:p>
@@ -5300,7 +5552,7 @@
                 <a:latin typeface="Palatino" pitchFamily="2" charset="77"/>
                 <a:ea typeface="Palatino" pitchFamily="2" charset="77"/>
               </a:rPr>
-              <a:t>To do that, we allocate probability across arms through a linear programming problem, which avoids overconsumption (optimistically).</a:t>
+              <a:t>To do that, we allocate probability across arms through a linear programming problem, which avoids overconsumption (optimistically)</a:t>
             </a:r>
             <a:endParaRPr lang="en-IT" sz="1800" dirty="0">
               <a:solidFill>
@@ -5446,7 +5698,7 @@
                 <a:latin typeface="Palatino" pitchFamily="2" charset="77"/>
                 <a:ea typeface="Palatino" pitchFamily="2" charset="77"/>
               </a:rPr>
-              <a:t>The algorithm successfully optimizes the usage per round.</a:t>
+              <a:t>The algorithm successfully optimizes the usage per round</a:t>
             </a:r>
           </a:p>
         </p:txBody>
@@ -5637,7 +5889,7 @@
                 <a:latin typeface="Palatino" pitchFamily="2" charset="77"/>
                 <a:ea typeface="Palatino" pitchFamily="2" charset="77"/>
               </a:rPr>
-              <a:t>The reason in this case is that we are comparing an algorithm playing with a max capacity against a clairvoyant which can keep selling an unlimited quantity of items.</a:t>
+              <a:t>The reason in this case is that we are comparing an algorithm playing with a max capacity against a clairvoyant which can keep selling an unlimited quantity of items</a:t>
             </a:r>
           </a:p>
           <a:p>
@@ -5871,7 +6123,7 @@
                 <a:latin typeface="Palatino" pitchFamily="2" charset="77"/>
                 <a:ea typeface="Palatino" pitchFamily="2" charset="77"/>
               </a:rPr>
-              <a:t>By playing the optimal arm, it consumes more than it should, turning not actually optimal in this setting. </a:t>
+              <a:t>By playing the optimal arm, it consumes more than it should, turning not actually optimal in this setting</a:t>
             </a:r>
           </a:p>
           <a:p>
@@ -5894,7 +6146,7 @@
                 <a:latin typeface="Palatino" pitchFamily="2" charset="77"/>
                 <a:ea typeface="Palatino" pitchFamily="2" charset="77"/>
               </a:rPr>
-              <a:t>Here, the algorithm "decides to sell less to sell enough” - at better price!.</a:t>
+              <a:t>Here, the algorithm "decides to sell less to sell enough” - at better price!</a:t>
             </a:r>
             <a:endParaRPr lang="en-IT" sz="1800" dirty="0">
               <a:solidFill>
@@ -6193,7 +6445,7 @@
                 <a:latin typeface="Palatino" pitchFamily="2" charset="77"/>
                 <a:ea typeface="Palatino" pitchFamily="2" charset="77"/>
               </a:rPr>
-              <a:t>Notice: our algorithm converges at such policy.</a:t>
+              <a:t>Notice: our algorithm converges at such policy</a:t>
             </a:r>
           </a:p>
         </p:txBody>
@@ -6244,7 +6496,7 @@
         </p:nvSpPr>
         <p:spPr>
           <a:xfrm>
-            <a:off x="838200" y="4802206"/>
+            <a:off x="838200" y="4653990"/>
             <a:ext cx="9495622" cy="1685580"/>
           </a:xfrm>
           <a:prstGeom prst="rect">
@@ -6458,7 +6710,7 @@
                 <a:latin typeface="Palatino" pitchFamily="2" charset="77"/>
                 <a:ea typeface="Palatino" pitchFamily="2" charset="77"/>
               </a:rPr>
-              <a:t>The cumulative regret against the fixed-price clairvoyant ends up negative.</a:t>
+              <a:t>The cumulative regret against the fixed-price clairvoyant ends up negative</a:t>
             </a:r>
           </a:p>
           <a:p>
@@ -6482,7 +6734,7 @@
                 <a:latin typeface="Palatino" pitchFamily="2" charset="77"/>
                 <a:ea typeface="Palatino" pitchFamily="2" charset="77"/>
               </a:rPr>
-              <a:t>Against the mixed-policy clairvoyant, the cumulative regret is slightly negative until the very last rounds, when a better usage leads the clairvoyant to a higher cumulative reward.</a:t>
+              <a:t>Against the mixed-policy clairvoyant, the cumulative regret is slightly negative until the very last rounds, when a better usage leads the clairvoyant to a higher cumulative reward</a:t>
             </a:r>
             <a:br>
               <a:rPr lang="en-GB" sz="1600" dirty="0">
@@ -6511,6 +6763,703 @@
     <p:extLst>
       <p:ext uri="{BB962C8B-B14F-4D97-AF65-F5344CB8AC3E}">
         <p14:creationId xmlns:p14="http://schemas.microsoft.com/office/powerpoint/2010/main" val="2728523084"/>
+      </p:ext>
+    </p:extLst>
+  </p:cSld>
+  <p:clrMapOvr>
+    <a:masterClrMapping/>
+  </p:clrMapOvr>
+</p:sld>
+</file>
+
+<file path=ppt/slides/slide18.xml><?xml version="1.0" encoding="utf-8"?>
+<p:sld xmlns:a="http://schemas.openxmlformats.org/drawingml/2006/main" xmlns:r="http://schemas.openxmlformats.org/officeDocument/2006/relationships" xmlns:p="http://schemas.openxmlformats.org/presentationml/2006/main">
+  <p:cSld>
+    <p:spTree>
+      <p:nvGrpSpPr>
+        <p:cNvPr id="1" name="">
+          <a:extLst>
+            <a:ext uri="{FF2B5EF4-FFF2-40B4-BE49-F238E27FC236}">
+              <a16:creationId xmlns:a16="http://schemas.microsoft.com/office/drawing/2014/main" id="{12A902EE-436C-F0F4-AC17-6E4A8B3C7EE2}"/>
+            </a:ext>
+          </a:extLst>
+        </p:cNvPr>
+        <p:cNvGrpSpPr/>
+        <p:nvPr/>
+      </p:nvGrpSpPr>
+      <p:grpSpPr>
+        <a:xfrm>
+          <a:off x="0" y="0"/>
+          <a:ext cx="0" cy="0"/>
+          <a:chOff x="0" y="0"/>
+          <a:chExt cx="0" cy="0"/>
+        </a:xfrm>
+      </p:grpSpPr>
+      <p:sp>
+        <p:nvSpPr>
+          <p:cNvPr id="2" name="Title 1">
+            <a:extLst>
+              <a:ext uri="{FF2B5EF4-FFF2-40B4-BE49-F238E27FC236}">
+                <a16:creationId xmlns:a16="http://schemas.microsoft.com/office/drawing/2014/main" id="{F2767EC2-6759-7E36-438B-DFABEA2BF2DC}"/>
+              </a:ext>
+            </a:extLst>
+          </p:cNvPr>
+          <p:cNvSpPr>
+            <a:spLocks noGrp="1"/>
+          </p:cNvSpPr>
+          <p:nvPr>
+            <p:ph type="title"/>
+          </p:nvPr>
+        </p:nvSpPr>
+        <p:spPr/>
+        <p:txBody>
+          <a:bodyPr/>
+          <a:lstStyle/>
+          <a:p>
+            <a:r>
+              <a:rPr lang="en-IT" dirty="0">
+                <a:latin typeface="Palatino" pitchFamily="2" charset="77"/>
+                <a:ea typeface="Palatino" pitchFamily="2" charset="77"/>
+              </a:rPr>
+              <a:t>Requirement 2</a:t>
+            </a:r>
+          </a:p>
+        </p:txBody>
+      </p:sp>
+      <p:sp>
+        <p:nvSpPr>
+          <p:cNvPr id="3" name="Text Placeholder 2">
+            <a:extLst>
+              <a:ext uri="{FF2B5EF4-FFF2-40B4-BE49-F238E27FC236}">
+                <a16:creationId xmlns:a16="http://schemas.microsoft.com/office/drawing/2014/main" id="{30D6A194-9AB6-6390-69F9-68764771E808}"/>
+              </a:ext>
+            </a:extLst>
+          </p:cNvPr>
+          <p:cNvSpPr>
+            <a:spLocks noGrp="1"/>
+          </p:cNvSpPr>
+          <p:nvPr>
+            <p:ph type="body" idx="1"/>
+          </p:nvPr>
+        </p:nvSpPr>
+        <p:spPr>
+          <a:xfrm>
+            <a:off x="831850" y="4799670"/>
+            <a:ext cx="10515600" cy="1500187"/>
+          </a:xfrm>
+        </p:spPr>
+        <p:txBody>
+          <a:bodyPr/>
+          <a:lstStyle/>
+          <a:p>
+            <a:r>
+              <a:rPr lang="en-IT" dirty="0">
+                <a:solidFill>
+                  <a:schemeClr val="bg1">
+                    <a:lumMod val="50000"/>
+                  </a:schemeClr>
+                </a:solidFill>
+                <a:latin typeface="Palatino" pitchFamily="2" charset="77"/>
+                <a:ea typeface="Palatino" pitchFamily="2" charset="77"/>
+              </a:rPr>
+              <a:t>With multiple products</a:t>
+            </a:r>
+          </a:p>
+        </p:txBody>
+      </p:sp>
+    </p:spTree>
+    <p:extLst>
+      <p:ext uri="{BB962C8B-B14F-4D97-AF65-F5344CB8AC3E}">
+        <p14:creationId xmlns:p14="http://schemas.microsoft.com/office/powerpoint/2010/main" val="3674136290"/>
+      </p:ext>
+    </p:extLst>
+  </p:cSld>
+  <p:clrMapOvr>
+    <a:masterClrMapping/>
+  </p:clrMapOvr>
+</p:sld>
+</file>
+
+<file path=ppt/slides/slide19.xml><?xml version="1.0" encoding="utf-8"?>
+<p:sld xmlns:a="http://schemas.openxmlformats.org/drawingml/2006/main" xmlns:r="http://schemas.openxmlformats.org/officeDocument/2006/relationships" xmlns:p="http://schemas.openxmlformats.org/presentationml/2006/main">
+  <p:cSld>
+    <p:spTree>
+      <p:nvGrpSpPr>
+        <p:cNvPr id="1" name="">
+          <a:extLst>
+            <a:ext uri="{FF2B5EF4-FFF2-40B4-BE49-F238E27FC236}">
+              <a16:creationId xmlns:a16="http://schemas.microsoft.com/office/drawing/2014/main" id="{FFE1035B-3D6C-9EC2-9443-24E3E6CA7354}"/>
+            </a:ext>
+          </a:extLst>
+        </p:cNvPr>
+        <p:cNvGrpSpPr/>
+        <p:nvPr/>
+      </p:nvGrpSpPr>
+      <p:grpSpPr>
+        <a:xfrm>
+          <a:off x="0" y="0"/>
+          <a:ext cx="0" cy="0"/>
+          <a:chOff x="0" y="0"/>
+          <a:chExt cx="0" cy="0"/>
+        </a:xfrm>
+      </p:grpSpPr>
+      <p:sp>
+        <p:nvSpPr>
+          <p:cNvPr id="2" name="Title 1">
+            <a:extLst>
+              <a:ext uri="{FF2B5EF4-FFF2-40B4-BE49-F238E27FC236}">
+                <a16:creationId xmlns:a16="http://schemas.microsoft.com/office/drawing/2014/main" id="{F8EF3367-7307-89D5-D223-65F250147CA6}"/>
+              </a:ext>
+            </a:extLst>
+          </p:cNvPr>
+          <p:cNvSpPr>
+            <a:spLocks noGrp="1"/>
+          </p:cNvSpPr>
+          <p:nvPr>
+            <p:ph type="title"/>
+          </p:nvPr>
+        </p:nvSpPr>
+        <p:spPr/>
+        <p:txBody>
+          <a:bodyPr/>
+          <a:lstStyle/>
+          <a:p>
+            <a:r>
+              <a:rPr lang="en-IT" dirty="0">
+                <a:latin typeface="Palatino" pitchFamily="2" charset="77"/>
+                <a:ea typeface="Palatino" pitchFamily="2" charset="77"/>
+              </a:rPr>
+              <a:t>Setting</a:t>
+            </a:r>
+          </a:p>
+        </p:txBody>
+      </p:sp>
+      <mc:AlternateContent xmlns:mc="http://schemas.openxmlformats.org/markup-compatibility/2006">
+        <mc:Choice xmlns:a14="http://schemas.microsoft.com/office/drawing/2010/main" Requires="a14">
+          <p:sp>
+            <p:nvSpPr>
+              <p:cNvPr id="5" name="TextBox 4">
+                <a:extLst>
+                  <a:ext uri="{FF2B5EF4-FFF2-40B4-BE49-F238E27FC236}">
+                    <a16:creationId xmlns:a16="http://schemas.microsoft.com/office/drawing/2014/main" id="{BB8CE10B-8EAB-3E1A-0F98-B28CBE842CAD}"/>
+                  </a:ext>
+                </a:extLst>
+              </p:cNvPr>
+              <p:cNvSpPr txBox="1"/>
+              <p:nvPr/>
+            </p:nvSpPr>
+            <p:spPr>
+              <a:xfrm>
+                <a:off x="838200" y="1690688"/>
+                <a:ext cx="10786242" cy="3354765"/>
+              </a:xfrm>
+              <a:prstGeom prst="rect">
+                <a:avLst/>
+              </a:prstGeom>
+              <a:noFill/>
+            </p:spPr>
+            <p:txBody>
+              <a:bodyPr wrap="square" rtlCol="0">
+                <a:spAutoFit/>
+              </a:bodyPr>
+              <a:lstStyle/>
+              <a:p>
+                <a:pPr>
+                  <a:spcAft>
+                    <a:spcPts val="1200"/>
+                  </a:spcAft>
+                </a:pPr>
+                <a:r>
+                  <a:rPr lang="en-IT" sz="2400" dirty="0">
+                    <a:latin typeface="Palatino" pitchFamily="2" charset="77"/>
+                    <a:ea typeface="Palatino" pitchFamily="2" charset="77"/>
+                  </a:rPr>
+                  <a:t>Assumptions</a:t>
+                </a:r>
+                <a:endParaRPr lang="en-IT" sz="2000" dirty="0">
+                  <a:latin typeface="Palatino" pitchFamily="2" charset="77"/>
+                  <a:ea typeface="Palatino" pitchFamily="2" charset="77"/>
+                </a:endParaRPr>
+              </a:p>
+              <a:p>
+                <a:r>
+                  <a:rPr lang="en-IT" dirty="0">
+                    <a:solidFill>
+                      <a:schemeClr val="bg1">
+                        <a:lumMod val="50000"/>
+                      </a:schemeClr>
+                    </a:solidFill>
+                    <a:latin typeface="Palatino" pitchFamily="2" charset="77"/>
+                    <a:ea typeface="Palatino" pitchFamily="2" charset="77"/>
+                  </a:rPr>
+                  <a:t>Average buyer valuation per product </a:t>
+                </a:r>
+                <a:r>
+                  <a:rPr lang="en-IT" i="1" dirty="0">
+                    <a:solidFill>
+                      <a:schemeClr val="bg1">
+                        <a:lumMod val="50000"/>
+                      </a:schemeClr>
+                    </a:solidFill>
+                    <a:latin typeface="Palatino" pitchFamily="2" charset="77"/>
+                    <a:ea typeface="Palatino" pitchFamily="2" charset="77"/>
+                  </a:rPr>
+                  <a:t>values: </a:t>
+                </a:r>
+                <a:r>
+                  <a:rPr lang="en-IT" dirty="0">
+                    <a:solidFill>
+                      <a:schemeClr val="bg1">
+                        <a:lumMod val="50000"/>
+                      </a:schemeClr>
+                    </a:solidFill>
+                    <a:latin typeface="Palatino" pitchFamily="2" charset="77"/>
+                    <a:ea typeface="Palatino" pitchFamily="2" charset="77"/>
+                  </a:rPr>
+                  <a:t>3.00€, 2.50€, 1.50€ and 6.00€</a:t>
+                </a:r>
+                <a:endParaRPr lang="en-IT" i="1" dirty="0">
+                  <a:solidFill>
+                    <a:schemeClr val="bg1">
+                      <a:lumMod val="50000"/>
+                    </a:schemeClr>
+                  </a:solidFill>
+                  <a:latin typeface="Palatino" pitchFamily="2" charset="77"/>
+                  <a:ea typeface="Palatino" pitchFamily="2" charset="77"/>
+                </a:endParaRPr>
+              </a:p>
+              <a:p>
+                <a:r>
+                  <a:rPr lang="en-IT" dirty="0">
+                    <a:solidFill>
+                      <a:schemeClr val="bg1">
+                        <a:lumMod val="50000"/>
+                      </a:schemeClr>
+                    </a:solidFill>
+                    <a:latin typeface="Palatino" pitchFamily="2" charset="77"/>
+                    <a:ea typeface="Palatino" pitchFamily="2" charset="77"/>
+                  </a:rPr>
+                  <a:t>Per product production </a:t>
+                </a:r>
+                <a:r>
+                  <a:rPr lang="en-IT" i="1" dirty="0">
+                    <a:solidFill>
+                      <a:schemeClr val="bg1">
+                        <a:lumMod val="50000"/>
+                      </a:schemeClr>
+                    </a:solidFill>
+                    <a:latin typeface="Palatino" pitchFamily="2" charset="77"/>
+                    <a:ea typeface="Palatino" pitchFamily="2" charset="77"/>
+                  </a:rPr>
+                  <a:t>costs: </a:t>
+                </a:r>
+                <a:r>
+                  <a:rPr lang="en-GB" dirty="0">
+                    <a:solidFill>
+                      <a:schemeClr val="bg1">
+                        <a:lumMod val="50000"/>
+                      </a:schemeClr>
+                    </a:solidFill>
+                    <a:latin typeface="Palatino" pitchFamily="2" charset="77"/>
+                    <a:ea typeface="Palatino" pitchFamily="2" charset="77"/>
+                  </a:rPr>
+                  <a:t>2.00€, 1.50€, 0.50€ and 4.00€</a:t>
+                </a:r>
+              </a:p>
+              <a:p>
+                <a:endParaRPr lang="en-IT" dirty="0">
+                  <a:solidFill>
+                    <a:schemeClr val="bg1">
+                      <a:lumMod val="50000"/>
+                    </a:schemeClr>
+                  </a:solidFill>
+                  <a:latin typeface="Palatino" pitchFamily="2" charset="77"/>
+                  <a:ea typeface="Palatino" pitchFamily="2" charset="77"/>
+                </a:endParaRPr>
+              </a:p>
+              <a:p>
+                <a:pPr>
+                  <a:spcAft>
+                    <a:spcPts val="1200"/>
+                  </a:spcAft>
+                </a:pPr>
+                <a:r>
+                  <a:rPr lang="en-IT" sz="2400" dirty="0">
+                    <a:latin typeface="Palatino" pitchFamily="2" charset="77"/>
+                    <a:ea typeface="Palatino" pitchFamily="2" charset="77"/>
+                  </a:rPr>
+                  <a:t>Parameters setting</a:t>
+                </a:r>
+                <a:endParaRPr lang="en-IT" sz="2000" dirty="0">
+                  <a:latin typeface="Palatino" pitchFamily="2" charset="77"/>
+                  <a:ea typeface="Palatino" pitchFamily="2" charset="77"/>
+                </a:endParaRPr>
+              </a:p>
+              <a:p>
+                <a:r>
+                  <a:rPr lang="en-IT" i="1" dirty="0">
+                    <a:solidFill>
+                      <a:schemeClr val="bg1">
+                        <a:lumMod val="50000"/>
+                      </a:schemeClr>
+                    </a:solidFill>
+                    <a:latin typeface="Palatino" pitchFamily="2" charset="77"/>
+                    <a:ea typeface="Palatino" pitchFamily="2" charset="77"/>
+                  </a:rPr>
+                  <a:t>T = 20000</a:t>
+                </a:r>
+              </a:p>
+              <a:p>
+                <a:r>
+                  <a:rPr lang="en-IT" i="1" dirty="0">
+                    <a:solidFill>
+                      <a:schemeClr val="bg1">
+                        <a:lumMod val="50000"/>
+                      </a:schemeClr>
+                    </a:solidFill>
+                    <a:latin typeface="Palatino" pitchFamily="2" charset="77"/>
+                    <a:ea typeface="Palatino" pitchFamily="2" charset="77"/>
+                  </a:rPr>
+                  <a:t>N = 4</a:t>
+                </a:r>
+              </a:p>
+              <a:p>
+                <a:r>
+                  <a:rPr lang="en-GB" i="1" dirty="0">
+                    <a:solidFill>
+                      <a:schemeClr val="bg1">
+                        <a:lumMod val="50000"/>
+                      </a:schemeClr>
+                    </a:solidFill>
+                    <a:latin typeface="Palatino" pitchFamily="2" charset="77"/>
+                    <a:ea typeface="Palatino" pitchFamily="2" charset="77"/>
+                  </a:rPr>
+                  <a:t>P</a:t>
+                </a:r>
+                <a:r>
+                  <a:rPr lang="en-GB" i="1" baseline="-25000" dirty="0">
+                    <a:solidFill>
+                      <a:schemeClr val="bg1">
+                        <a:lumMod val="50000"/>
+                      </a:schemeClr>
+                    </a:solidFill>
+                    <a:latin typeface="Palatino" pitchFamily="2" charset="77"/>
+                    <a:ea typeface="Palatino" pitchFamily="2" charset="77"/>
+                  </a:rPr>
+                  <a:t>i</a:t>
+                </a:r>
+                <a:r>
+                  <a:rPr lang="en-GB" i="1" dirty="0">
+                    <a:solidFill>
+                      <a:schemeClr val="bg1">
+                        <a:lumMod val="50000"/>
+                      </a:schemeClr>
+                    </a:solidFill>
+                    <a:latin typeface="Palatino" pitchFamily="2" charset="77"/>
+                    <a:ea typeface="Palatino" pitchFamily="2" charset="77"/>
+                  </a:rPr>
+                  <a:t> =</a:t>
+                </a:r>
+                <a:r>
+                  <a:rPr lang="en-GB" dirty="0">
+                    <a:solidFill>
+                      <a:schemeClr val="bg1">
+                        <a:lumMod val="50000"/>
+                      </a:schemeClr>
+                    </a:solidFill>
+                  </a:rPr>
+                  <a:t> { x</a:t>
+                </a:r>
+                <a:r>
+                  <a:rPr lang="en-GB" baseline="-25000" dirty="0">
+                    <a:solidFill>
+                      <a:schemeClr val="bg1">
+                        <a:lumMod val="50000"/>
+                      </a:schemeClr>
+                    </a:solidFill>
+                  </a:rPr>
+                  <a:t>1</a:t>
+                </a:r>
+                <a:r>
+                  <a:rPr lang="en-GB" dirty="0">
+                    <a:solidFill>
+                      <a:schemeClr val="bg1">
+                        <a:lumMod val="50000"/>
+                      </a:schemeClr>
+                    </a:solidFill>
+                  </a:rPr>
+                  <a:t>​, …, x</a:t>
+                </a:r>
+                <a:r>
+                  <a:rPr lang="en-GB" baseline="-25000" dirty="0">
+                    <a:solidFill>
+                      <a:schemeClr val="bg1">
+                        <a:lumMod val="50000"/>
+                      </a:schemeClr>
+                    </a:solidFill>
+                  </a:rPr>
+                  <a:t>k </a:t>
+                </a:r>
+                <a:r>
+                  <a:rPr lang="en-GB" dirty="0">
+                    <a:solidFill>
+                      <a:schemeClr val="bg1">
+                        <a:lumMod val="50000"/>
+                      </a:schemeClr>
+                    </a:solidFill>
+                  </a:rPr>
+                  <a:t>​} ⊂ R set of K equally spaced points in [0, 2 </a:t>
+                </a:r>
+                <a14:m>
+                  <m:oMath xmlns:m="http://schemas.openxmlformats.org/officeDocument/2006/math">
+                    <m:r>
+                      <a:rPr lang="en-GB" i="1" smtClean="0">
+                        <a:solidFill>
+                          <a:schemeClr val="bg1">
+                            <a:lumMod val="50000"/>
+                          </a:schemeClr>
+                        </a:solidFill>
+                        <a:latin typeface="Cambria Math" panose="02040503050406030204" pitchFamily="18" charset="0"/>
+                        <a:ea typeface="Cambria Math" panose="02040503050406030204" pitchFamily="18" charset="0"/>
+                      </a:rPr>
+                      <m:t>∙</m:t>
+                    </m:r>
+                  </m:oMath>
+                </a14:m>
+                <a:r>
+                  <a:rPr lang="en-GB" dirty="0">
+                    <a:solidFill>
+                      <a:schemeClr val="bg1">
+                        <a:lumMod val="50000"/>
+                      </a:schemeClr>
+                    </a:solidFill>
+                  </a:rPr>
+                  <a:t> values</a:t>
+                </a:r>
+                <a:r>
+                  <a:rPr lang="en-GB" baseline="-25000" dirty="0">
+                    <a:solidFill>
+                      <a:schemeClr val="bg1">
+                        <a:lumMod val="50000"/>
+                      </a:schemeClr>
+                    </a:solidFill>
+                  </a:rPr>
+                  <a:t>i</a:t>
+                </a:r>
+                <a:r>
+                  <a:rPr lang="en-GB" dirty="0">
+                    <a:solidFill>
+                      <a:schemeClr val="bg1">
+                        <a:lumMod val="50000"/>
+                      </a:schemeClr>
+                    </a:solidFill>
+                  </a:rPr>
+                  <a:t>] for each product </a:t>
+                </a:r>
+                <a:r>
+                  <a:rPr lang="en-GB" i="1" dirty="0">
+                    <a:solidFill>
+                      <a:schemeClr val="bg1">
+                        <a:lumMod val="50000"/>
+                      </a:schemeClr>
+                    </a:solidFill>
+                  </a:rPr>
+                  <a:t>i = 1, …, N</a:t>
+                </a:r>
+              </a:p>
+              <a:p>
+                <a:r>
+                  <a:rPr lang="en-IT" i="1" dirty="0">
+                    <a:solidFill>
+                      <a:schemeClr val="bg1">
+                        <a:lumMod val="50000"/>
+                      </a:schemeClr>
+                    </a:solidFill>
+                    <a:latin typeface="Palatino" pitchFamily="2" charset="77"/>
+                    <a:ea typeface="Palatino" pitchFamily="2" charset="77"/>
+                  </a:rPr>
+                  <a:t>K = </a:t>
+                </a:r>
+                <a14:m>
+                  <m:oMath xmlns:m="http://schemas.openxmlformats.org/officeDocument/2006/math">
+                    <m:r>
+                      <a:rPr lang="it-IT" b="0" i="1" smtClean="0">
+                        <a:solidFill>
+                          <a:schemeClr val="bg1">
+                            <a:lumMod val="50000"/>
+                          </a:schemeClr>
+                        </a:solidFill>
+                        <a:latin typeface="Cambria Math" panose="02040503050406030204" pitchFamily="18" charset="0"/>
+                        <a:ea typeface="Palatino" pitchFamily="2" charset="77"/>
+                      </a:rPr>
+                      <m:t>| </m:t>
+                    </m:r>
+                    <m:r>
+                      <a:rPr lang="it-IT" b="0" i="1" smtClean="0">
+                        <a:solidFill>
+                          <a:schemeClr val="bg1">
+                            <a:lumMod val="50000"/>
+                          </a:schemeClr>
+                        </a:solidFill>
+                        <a:latin typeface="Cambria Math" panose="02040503050406030204" pitchFamily="18" charset="0"/>
+                        <a:ea typeface="Palatino" pitchFamily="2" charset="77"/>
+                      </a:rPr>
+                      <m:t>𝑃</m:t>
+                    </m:r>
+                    <m:r>
+                      <a:rPr lang="it-IT" b="0" i="1" smtClean="0">
+                        <a:solidFill>
+                          <a:schemeClr val="bg1">
+                            <a:lumMod val="50000"/>
+                          </a:schemeClr>
+                        </a:solidFill>
+                        <a:latin typeface="Cambria Math" panose="02040503050406030204" pitchFamily="18" charset="0"/>
+                        <a:ea typeface="Palatino" pitchFamily="2" charset="77"/>
+                      </a:rPr>
+                      <m:t> |</m:t>
+                    </m:r>
+                  </m:oMath>
+                </a14:m>
+                <a:r>
+                  <a:rPr lang="en-IT" i="1" dirty="0">
+                    <a:solidFill>
+                      <a:schemeClr val="bg1">
+                        <a:lumMod val="50000"/>
+                      </a:schemeClr>
+                    </a:solidFill>
+                    <a:latin typeface="Palatino" pitchFamily="2" charset="77"/>
+                    <a:ea typeface="Palatino" pitchFamily="2" charset="77"/>
+                  </a:rPr>
+                  <a:t> = 5</a:t>
+                </a:r>
+              </a:p>
+              <a:p>
+                <a:r>
+                  <a:rPr lang="it-IT" i="1" dirty="0">
+                    <a:solidFill>
+                      <a:schemeClr val="bg1">
+                        <a:lumMod val="50000"/>
+                      </a:schemeClr>
+                    </a:solidFill>
+                    <a:latin typeface="Palatino" pitchFamily="2" charset="77"/>
+                    <a:ea typeface="Palatino" pitchFamily="2" charset="77"/>
+                  </a:rPr>
+                  <a:t>B = </a:t>
+                </a:r>
+                <a:r>
+                  <a:rPr lang="en-GB" i="1" dirty="0">
+                    <a:solidFill>
+                      <a:schemeClr val="bg1">
+                        <a:lumMod val="50000"/>
+                      </a:schemeClr>
+                    </a:solidFill>
+                    <a:latin typeface="Palatino" pitchFamily="2" charset="77"/>
+                    <a:ea typeface="Palatino" pitchFamily="2" charset="77"/>
+                  </a:rPr>
+                  <a:t>120000 </a:t>
+                </a:r>
+                <a14:m>
+                  <m:oMath xmlns:m="http://schemas.openxmlformats.org/officeDocument/2006/math">
+                    <m:r>
+                      <a:rPr lang="en-GB" i="1">
+                        <a:solidFill>
+                          <a:schemeClr val="bg1">
+                            <a:lumMod val="50000"/>
+                          </a:schemeClr>
+                        </a:solidFill>
+                        <a:latin typeface="Cambria Math" panose="02040503050406030204" pitchFamily="18" charset="0"/>
+                        <a:ea typeface="Cambria Math" panose="02040503050406030204" pitchFamily="18" charset="0"/>
+                      </a:rPr>
+                      <m:t>∙</m:t>
+                    </m:r>
+                    <m:r>
+                      <a:rPr lang="it-IT" i="1">
+                        <a:solidFill>
+                          <a:schemeClr val="bg1">
+                            <a:lumMod val="50000"/>
+                          </a:schemeClr>
+                        </a:solidFill>
+                        <a:latin typeface="Cambria Math" panose="02040503050406030204" pitchFamily="18" charset="0"/>
+                        <a:ea typeface="Cambria Math" panose="02040503050406030204" pitchFamily="18" charset="0"/>
+                      </a:rPr>
+                      <m:t> </m:t>
+                    </m:r>
+                  </m:oMath>
+                </a14:m>
+                <a:r>
+                  <a:rPr lang="en-GB" i="1" dirty="0">
+                    <a:solidFill>
+                      <a:schemeClr val="bg1">
+                        <a:lumMod val="50000"/>
+                      </a:schemeClr>
+                    </a:solidFill>
+                    <a:latin typeface="Palatino" pitchFamily="2" charset="77"/>
+                    <a:ea typeface="Palatino" pitchFamily="2" charset="77"/>
+                  </a:rPr>
+                  <a:t>N</a:t>
+                </a:r>
+                <a:endParaRPr lang="en-IT" i="1" dirty="0">
+                  <a:solidFill>
+                    <a:schemeClr val="bg1">
+                      <a:lumMod val="50000"/>
+                    </a:schemeClr>
+                  </a:solidFill>
+                  <a:latin typeface="Palatino" pitchFamily="2" charset="77"/>
+                  <a:ea typeface="Palatino" pitchFamily="2" charset="77"/>
+                </a:endParaRPr>
+              </a:p>
+            </p:txBody>
+          </p:sp>
+        </mc:Choice>
+        <mc:Fallback>
+          <p:sp>
+            <p:nvSpPr>
+              <p:cNvPr id="5" name="TextBox 4">
+                <a:extLst>
+                  <a:ext uri="{FF2B5EF4-FFF2-40B4-BE49-F238E27FC236}">
+                    <a16:creationId xmlns:a16="http://schemas.microsoft.com/office/drawing/2014/main" id="{BB8CE10B-8EAB-3E1A-0F98-B28CBE842CAD}"/>
+                  </a:ext>
+                </a:extLst>
+              </p:cNvPr>
+              <p:cNvSpPr txBox="1">
+                <a:spLocks noRot="1" noChangeAspect="1" noMove="1" noResize="1" noEditPoints="1" noAdjustHandles="1" noChangeArrowheads="1" noChangeShapeType="1" noTextEdit="1"/>
+              </p:cNvSpPr>
+              <p:nvPr/>
+            </p:nvSpPr>
+            <p:spPr>
+              <a:xfrm>
+                <a:off x="838200" y="1690688"/>
+                <a:ext cx="10786242" cy="3354765"/>
+              </a:xfrm>
+              <a:prstGeom prst="rect">
+                <a:avLst/>
+              </a:prstGeom>
+              <a:blipFill>
+                <a:blip r:embed="rId3"/>
+                <a:stretch>
+                  <a:fillRect l="-941" t="-1128" b="-1504"/>
+                </a:stretch>
+              </a:blipFill>
+            </p:spPr>
+            <p:txBody>
+              <a:bodyPr/>
+              <a:lstStyle/>
+              <a:p>
+                <a:r>
+                  <a:rPr lang="en-IT">
+                    <a:noFill/>
+                  </a:rPr>
+                  <a:t> </a:t>
+                </a:r>
+              </a:p>
+            </p:txBody>
+          </p:sp>
+        </mc:Fallback>
+      </mc:AlternateContent>
+    </p:spTree>
+    <p:extLst>
+      <p:ext uri="{BB962C8B-B14F-4D97-AF65-F5344CB8AC3E}">
+        <p14:creationId xmlns:p14="http://schemas.microsoft.com/office/powerpoint/2010/main" val="3271339014"/>
       </p:ext>
     </p:extLst>
   </p:cSld>
@@ -6613,6 +7562,1040 @@
     <p:extLst>
       <p:ext uri="{BB962C8B-B14F-4D97-AF65-F5344CB8AC3E}">
         <p14:creationId xmlns:p14="http://schemas.microsoft.com/office/powerpoint/2010/main" val="1526035182"/>
+      </p:ext>
+    </p:extLst>
+  </p:cSld>
+  <p:clrMapOvr>
+    <a:masterClrMapping/>
+  </p:clrMapOvr>
+</p:sld>
+</file>
+
+<file path=ppt/slides/slide20.xml><?xml version="1.0" encoding="utf-8"?>
+<p:sld xmlns:a="http://schemas.openxmlformats.org/drawingml/2006/main" xmlns:r="http://schemas.openxmlformats.org/officeDocument/2006/relationships" xmlns:p="http://schemas.openxmlformats.org/presentationml/2006/main">
+  <p:cSld>
+    <p:spTree>
+      <p:nvGrpSpPr>
+        <p:cNvPr id="1" name="">
+          <a:extLst>
+            <a:ext uri="{FF2B5EF4-FFF2-40B4-BE49-F238E27FC236}">
+              <a16:creationId xmlns:a16="http://schemas.microsoft.com/office/drawing/2014/main" id="{92E19380-5071-169E-7D46-42E2649349A3}"/>
+            </a:ext>
+          </a:extLst>
+        </p:cNvPr>
+        <p:cNvGrpSpPr/>
+        <p:nvPr/>
+      </p:nvGrpSpPr>
+      <p:grpSpPr>
+        <a:xfrm>
+          <a:off x="0" y="0"/>
+          <a:ext cx="0" cy="0"/>
+          <a:chOff x="0" y="0"/>
+          <a:chExt cx="0" cy="0"/>
+        </a:xfrm>
+      </p:grpSpPr>
+      <p:sp>
+        <p:nvSpPr>
+          <p:cNvPr id="2" name="Title 1">
+            <a:extLst>
+              <a:ext uri="{FF2B5EF4-FFF2-40B4-BE49-F238E27FC236}">
+                <a16:creationId xmlns:a16="http://schemas.microsoft.com/office/drawing/2014/main" id="{C03C2F0B-D81B-4EA5-6ADC-C10FAADEA653}"/>
+              </a:ext>
+            </a:extLst>
+          </p:cNvPr>
+          <p:cNvSpPr>
+            <a:spLocks noGrp="1"/>
+          </p:cNvSpPr>
+          <p:nvPr>
+            <p:ph type="title"/>
+          </p:nvPr>
+        </p:nvSpPr>
+        <p:spPr>
+          <a:xfrm>
+            <a:off x="838200" y="587633"/>
+            <a:ext cx="10515600" cy="1325563"/>
+          </a:xfrm>
+        </p:spPr>
+        <p:txBody>
+          <a:bodyPr/>
+          <a:lstStyle/>
+          <a:p>
+            <a:pPr algn="ctr"/>
+            <a:r>
+              <a:rPr lang="en-IT" sz="5400" dirty="0">
+                <a:latin typeface="Palatino" pitchFamily="2" charset="77"/>
+                <a:ea typeface="Palatino" pitchFamily="2" charset="77"/>
+              </a:rPr>
+              <a:t>Setting</a:t>
+            </a:r>
+            <a:endParaRPr lang="en-IT" dirty="0">
+              <a:latin typeface="Palatino" pitchFamily="2" charset="77"/>
+              <a:ea typeface="Palatino" pitchFamily="2" charset="77"/>
+            </a:endParaRPr>
+          </a:p>
+        </p:txBody>
+      </p:sp>
+      <p:sp>
+        <p:nvSpPr>
+          <p:cNvPr id="5" name="Content Placeholder 4">
+            <a:extLst>
+              <a:ext uri="{FF2B5EF4-FFF2-40B4-BE49-F238E27FC236}">
+                <a16:creationId xmlns:a16="http://schemas.microsoft.com/office/drawing/2014/main" id="{CEF8A580-B409-C942-DFD9-EB6DC7C44370}"/>
+              </a:ext>
+            </a:extLst>
+          </p:cNvPr>
+          <p:cNvSpPr>
+            <a:spLocks noGrp="1"/>
+          </p:cNvSpPr>
+          <p:nvPr>
+            <p:ph idx="1"/>
+          </p:nvPr>
+        </p:nvSpPr>
+        <p:spPr/>
+        <p:txBody>
+          <a:bodyPr>
+            <a:normAutofit/>
+          </a:bodyPr>
+          <a:lstStyle/>
+          <a:p>
+            <a:pPr marL="0" indent="0">
+              <a:spcBef>
+                <a:spcPts val="0"/>
+              </a:spcBef>
+              <a:spcAft>
+                <a:spcPts val="600"/>
+              </a:spcAft>
+              <a:buNone/>
+            </a:pPr>
+            <a:r>
+              <a:rPr lang="en-GB" sz="2400" dirty="0">
+                <a:latin typeface="Palatino" pitchFamily="2" charset="77"/>
+                <a:ea typeface="Palatino" pitchFamily="2" charset="77"/>
+              </a:rPr>
+              <a:t>Best Expected Prices</a:t>
+            </a:r>
+          </a:p>
+          <a:p>
+            <a:pPr marL="0" indent="0">
+              <a:buNone/>
+            </a:pPr>
+            <a:r>
+              <a:rPr lang="en-GB" sz="1800" dirty="0">
+                <a:solidFill>
+                  <a:schemeClr val="bg1">
+                    <a:lumMod val="50000"/>
+                  </a:schemeClr>
+                </a:solidFill>
+                <a:latin typeface="Palatino" pitchFamily="2" charset="77"/>
+                <a:ea typeface="Palatino" pitchFamily="2" charset="77"/>
+              </a:rPr>
+              <a:t>Product 1: optimal price = €3.50, expected profit = €23.14</a:t>
+            </a:r>
+          </a:p>
+          <a:p>
+            <a:pPr marL="0" indent="0">
+              <a:buNone/>
+            </a:pPr>
+            <a:r>
+              <a:rPr lang="en-GB" sz="1800" dirty="0">
+                <a:solidFill>
+                  <a:schemeClr val="bg1">
+                    <a:lumMod val="50000"/>
+                  </a:schemeClr>
+                </a:solidFill>
+                <a:latin typeface="Palatino" pitchFamily="2" charset="77"/>
+                <a:ea typeface="Palatino" pitchFamily="2" charset="77"/>
+              </a:rPr>
+              <a:t>Product 2: optimal price = €2.88, expected profit = €21.97</a:t>
+            </a:r>
+          </a:p>
+          <a:p>
+            <a:pPr marL="0" indent="0">
+              <a:buNone/>
+            </a:pPr>
+            <a:r>
+              <a:rPr lang="en-GB" sz="1800" dirty="0">
+                <a:solidFill>
+                  <a:schemeClr val="bg1">
+                    <a:lumMod val="50000"/>
+                  </a:schemeClr>
+                </a:solidFill>
+                <a:latin typeface="Palatino" pitchFamily="2" charset="77"/>
+                <a:ea typeface="Palatino" pitchFamily="2" charset="77"/>
+              </a:rPr>
+              <a:t>Product 3: optimal price = €1.62, expected profit = €22.57</a:t>
+            </a:r>
+          </a:p>
+          <a:p>
+            <a:pPr marL="0" indent="0">
+              <a:buNone/>
+            </a:pPr>
+            <a:r>
+              <a:rPr lang="en-GB" sz="1800" dirty="0">
+                <a:solidFill>
+                  <a:schemeClr val="bg1">
+                    <a:lumMod val="50000"/>
+                  </a:schemeClr>
+                </a:solidFill>
+                <a:latin typeface="Palatino" pitchFamily="2" charset="77"/>
+                <a:ea typeface="Palatino" pitchFamily="2" charset="77"/>
+              </a:rPr>
+              <a:t>Product 4: optimal price = €7.00, expected profit = €37.87</a:t>
+            </a:r>
+          </a:p>
+          <a:p>
+            <a:endParaRPr lang="en-GB" sz="2400" dirty="0">
+              <a:latin typeface="Palatino" pitchFamily="2" charset="77"/>
+              <a:ea typeface="Palatino" pitchFamily="2" charset="77"/>
+            </a:endParaRPr>
+          </a:p>
+          <a:p>
+            <a:pPr marL="0" indent="0">
+              <a:spcBef>
+                <a:spcPts val="0"/>
+              </a:spcBef>
+              <a:spcAft>
+                <a:spcPts val="600"/>
+              </a:spcAft>
+              <a:buNone/>
+            </a:pPr>
+            <a:r>
+              <a:rPr lang="en-GB" sz="2400" dirty="0">
+                <a:latin typeface="Palatino" pitchFamily="2" charset="77"/>
+                <a:ea typeface="Palatino" pitchFamily="2" charset="77"/>
+              </a:rPr>
+              <a:t>Best Super Arm - Overall</a:t>
+            </a:r>
+          </a:p>
+          <a:p>
+            <a:pPr marL="0" indent="0">
+              <a:buNone/>
+            </a:pPr>
+            <a:r>
+              <a:rPr lang="en-GB" sz="1800" dirty="0">
+                <a:solidFill>
+                  <a:schemeClr val="bg1">
+                    <a:lumMod val="50000"/>
+                  </a:schemeClr>
+                </a:solidFill>
+                <a:latin typeface="Palatino" pitchFamily="2" charset="77"/>
+                <a:ea typeface="Palatino" pitchFamily="2" charset="77"/>
+              </a:rPr>
+              <a:t>Total expected profit = €105.56</a:t>
+            </a:r>
+          </a:p>
+          <a:p>
+            <a:pPr marL="0" indent="0">
+              <a:buNone/>
+            </a:pPr>
+            <a:r>
+              <a:rPr lang="en-GB" sz="1800" dirty="0">
+                <a:solidFill>
+                  <a:schemeClr val="bg1">
+                    <a:lumMod val="50000"/>
+                  </a:schemeClr>
+                </a:solidFill>
+                <a:latin typeface="Palatino" pitchFamily="2" charset="77"/>
+                <a:ea typeface="Palatino" pitchFamily="2" charset="77"/>
+              </a:rPr>
+              <a:t>Expected total demand: 64.10 units</a:t>
+            </a:r>
+            <a:endParaRPr lang="en-IT" sz="1800" dirty="0">
+              <a:solidFill>
+                <a:schemeClr val="bg1">
+                  <a:lumMod val="50000"/>
+                </a:schemeClr>
+              </a:solidFill>
+              <a:latin typeface="Palatino" pitchFamily="2" charset="77"/>
+              <a:ea typeface="Palatino" pitchFamily="2" charset="77"/>
+            </a:endParaRPr>
+          </a:p>
+        </p:txBody>
+      </p:sp>
+    </p:spTree>
+    <p:extLst>
+      <p:ext uri="{BB962C8B-B14F-4D97-AF65-F5344CB8AC3E}">
+        <p14:creationId xmlns:p14="http://schemas.microsoft.com/office/powerpoint/2010/main" val="2650900473"/>
+      </p:ext>
+    </p:extLst>
+  </p:cSld>
+  <p:clrMapOvr>
+    <a:masterClrMapping/>
+  </p:clrMapOvr>
+</p:sld>
+</file>
+
+<file path=ppt/slides/slide21.xml><?xml version="1.0" encoding="utf-8"?>
+<p:sld xmlns:a="http://schemas.openxmlformats.org/drawingml/2006/main" xmlns:r="http://schemas.openxmlformats.org/officeDocument/2006/relationships" xmlns:p="http://schemas.openxmlformats.org/presentationml/2006/main">
+  <p:cSld>
+    <p:spTree>
+      <p:nvGrpSpPr>
+        <p:cNvPr id="1" name="">
+          <a:extLst>
+            <a:ext uri="{FF2B5EF4-FFF2-40B4-BE49-F238E27FC236}">
+              <a16:creationId xmlns:a16="http://schemas.microsoft.com/office/drawing/2014/main" id="{A6F439DB-897C-5248-0948-7C2D8648D6A4}"/>
+            </a:ext>
+          </a:extLst>
+        </p:cNvPr>
+        <p:cNvGrpSpPr/>
+        <p:nvPr/>
+      </p:nvGrpSpPr>
+      <p:grpSpPr>
+        <a:xfrm>
+          <a:off x="0" y="0"/>
+          <a:ext cx="0" cy="0"/>
+          <a:chOff x="0" y="0"/>
+          <a:chExt cx="0" cy="0"/>
+        </a:xfrm>
+      </p:grpSpPr>
+      <p:sp>
+        <p:nvSpPr>
+          <p:cNvPr id="2" name="Title 1">
+            <a:extLst>
+              <a:ext uri="{FF2B5EF4-FFF2-40B4-BE49-F238E27FC236}">
+                <a16:creationId xmlns:a16="http://schemas.microsoft.com/office/drawing/2014/main" id="{E52ECE08-389C-2924-D274-EDD22D895F31}"/>
+              </a:ext>
+            </a:extLst>
+          </p:cNvPr>
+          <p:cNvSpPr>
+            <a:spLocks noGrp="1"/>
+          </p:cNvSpPr>
+          <p:nvPr>
+            <p:ph type="title"/>
+          </p:nvPr>
+        </p:nvSpPr>
+        <p:spPr>
+          <a:xfrm>
+            <a:off x="838200" y="587633"/>
+            <a:ext cx="10515600" cy="1325563"/>
+          </a:xfrm>
+        </p:spPr>
+        <p:txBody>
+          <a:bodyPr/>
+          <a:lstStyle/>
+          <a:p>
+            <a:pPr algn="ctr"/>
+            <a:r>
+              <a:rPr lang="en-IT" sz="5400" dirty="0">
+                <a:latin typeface="Palatino" pitchFamily="2" charset="77"/>
+                <a:ea typeface="Palatino" pitchFamily="2" charset="77"/>
+              </a:rPr>
+              <a:t>Setting</a:t>
+            </a:r>
+            <a:endParaRPr lang="en-IT" dirty="0">
+              <a:latin typeface="Palatino" pitchFamily="2" charset="77"/>
+              <a:ea typeface="Palatino" pitchFamily="2" charset="77"/>
+            </a:endParaRPr>
+          </a:p>
+        </p:txBody>
+      </p:sp>
+      <p:pic>
+        <p:nvPicPr>
+          <p:cNvPr id="3" name="Content Placeholder 2">
+            <a:extLst>
+              <a:ext uri="{FF2B5EF4-FFF2-40B4-BE49-F238E27FC236}">
+                <a16:creationId xmlns:a16="http://schemas.microsoft.com/office/drawing/2014/main" id="{7ECBC03C-A251-C11D-C479-1B87E977719A}"/>
+              </a:ext>
+            </a:extLst>
+          </p:cNvPr>
+          <p:cNvPicPr>
+            <a:picLocks noGrp="1" noChangeAspect="1"/>
+          </p:cNvPicPr>
+          <p:nvPr>
+            <p:ph idx="1"/>
+          </p:nvPr>
+        </p:nvPicPr>
+        <p:blipFill>
+          <a:blip r:embed="rId2"/>
+          <a:stretch>
+            <a:fillRect/>
+          </a:stretch>
+        </p:blipFill>
+        <p:spPr>
+          <a:xfrm>
+            <a:off x="965200" y="2267744"/>
+            <a:ext cx="10261600" cy="3467100"/>
+          </a:xfrm>
+          <a:prstGeom prst="rect">
+            <a:avLst/>
+          </a:prstGeom>
+        </p:spPr>
+      </p:pic>
+    </p:spTree>
+    <p:extLst>
+      <p:ext uri="{BB962C8B-B14F-4D97-AF65-F5344CB8AC3E}">
+        <p14:creationId xmlns:p14="http://schemas.microsoft.com/office/powerpoint/2010/main" val="2246106138"/>
+      </p:ext>
+    </p:extLst>
+  </p:cSld>
+  <p:clrMapOvr>
+    <a:masterClrMapping/>
+  </p:clrMapOvr>
+</p:sld>
+</file>
+
+<file path=ppt/slides/slide22.xml><?xml version="1.0" encoding="utf-8"?>
+<p:sld xmlns:a="http://schemas.openxmlformats.org/drawingml/2006/main" xmlns:r="http://schemas.openxmlformats.org/officeDocument/2006/relationships" xmlns:p="http://schemas.openxmlformats.org/presentationml/2006/main">
+  <p:cSld>
+    <p:spTree>
+      <p:nvGrpSpPr>
+        <p:cNvPr id="1" name="">
+          <a:extLst>
+            <a:ext uri="{FF2B5EF4-FFF2-40B4-BE49-F238E27FC236}">
+              <a16:creationId xmlns:a16="http://schemas.microsoft.com/office/drawing/2014/main" id="{927D1F0B-9CF8-8F30-54AD-0CCB0CB025C7}"/>
+            </a:ext>
+          </a:extLst>
+        </p:cNvPr>
+        <p:cNvGrpSpPr/>
+        <p:nvPr/>
+      </p:nvGrpSpPr>
+      <p:grpSpPr>
+        <a:xfrm>
+          <a:off x="0" y="0"/>
+          <a:ext cx="0" cy="0"/>
+          <a:chOff x="0" y="0"/>
+          <a:chExt cx="0" cy="0"/>
+        </a:xfrm>
+      </p:grpSpPr>
+      <p:sp>
+        <p:nvSpPr>
+          <p:cNvPr id="2" name="Title 1">
+            <a:extLst>
+              <a:ext uri="{FF2B5EF4-FFF2-40B4-BE49-F238E27FC236}">
+                <a16:creationId xmlns:a16="http://schemas.microsoft.com/office/drawing/2014/main" id="{0B1DCA80-9122-A687-B7DD-B035EE57C256}"/>
+              </a:ext>
+            </a:extLst>
+          </p:cNvPr>
+          <p:cNvSpPr>
+            <a:spLocks noGrp="1"/>
+          </p:cNvSpPr>
+          <p:nvPr>
+            <p:ph type="title"/>
+          </p:nvPr>
+        </p:nvSpPr>
+        <p:spPr/>
+        <p:txBody>
+          <a:bodyPr/>
+          <a:lstStyle/>
+          <a:p>
+            <a:r>
+              <a:rPr lang="en-IT" dirty="0">
+                <a:latin typeface="Palatino" pitchFamily="2" charset="77"/>
+                <a:ea typeface="Palatino" pitchFamily="2" charset="77"/>
+              </a:rPr>
+              <a:t>Environment</a:t>
+            </a:r>
+          </a:p>
+        </p:txBody>
+      </p:sp>
+      <p:sp>
+        <p:nvSpPr>
+          <p:cNvPr id="5" name="TextBox 4">
+            <a:extLst>
+              <a:ext uri="{FF2B5EF4-FFF2-40B4-BE49-F238E27FC236}">
+                <a16:creationId xmlns:a16="http://schemas.microsoft.com/office/drawing/2014/main" id="{246C162F-5731-4FBB-6A7D-9834114705F1}"/>
+              </a:ext>
+            </a:extLst>
+          </p:cNvPr>
+          <p:cNvSpPr txBox="1"/>
+          <p:nvPr/>
+        </p:nvSpPr>
+        <p:spPr>
+          <a:xfrm>
+            <a:off x="838200" y="1690688"/>
+            <a:ext cx="9851571" cy="2862322"/>
+          </a:xfrm>
+          <a:prstGeom prst="rect">
+            <a:avLst/>
+          </a:prstGeom>
+          <a:noFill/>
+        </p:spPr>
+        <p:txBody>
+          <a:bodyPr wrap="square" rtlCol="0">
+            <a:spAutoFit/>
+          </a:bodyPr>
+          <a:lstStyle/>
+          <a:p>
+            <a:pPr>
+              <a:spcAft>
+                <a:spcPts val="1200"/>
+              </a:spcAft>
+            </a:pPr>
+            <a:r>
+              <a:rPr lang="en-IT" sz="2400" dirty="0">
+                <a:latin typeface="Palatino" pitchFamily="2" charset="77"/>
+                <a:ea typeface="Palatino" pitchFamily="2" charset="77"/>
+              </a:rPr>
+              <a:t>Assumptions</a:t>
+            </a:r>
+            <a:endParaRPr lang="en-IT" sz="2000" dirty="0">
+              <a:latin typeface="Palatino" pitchFamily="2" charset="77"/>
+              <a:ea typeface="Palatino" pitchFamily="2" charset="77"/>
+            </a:endParaRPr>
+          </a:p>
+          <a:p>
+            <a:r>
+              <a:rPr lang="en-IT" dirty="0">
+                <a:solidFill>
+                  <a:schemeClr val="bg1">
+                    <a:lumMod val="50000"/>
+                  </a:schemeClr>
+                </a:solidFill>
+                <a:latin typeface="Palatino" pitchFamily="2" charset="77"/>
+                <a:ea typeface="Palatino" pitchFamily="2" charset="77"/>
+              </a:rPr>
+              <a:t>There are </a:t>
+            </a:r>
+            <a:r>
+              <a:rPr lang="en-IT" i="1" dirty="0">
+                <a:solidFill>
+                  <a:schemeClr val="bg1">
+                    <a:lumMod val="50000"/>
+                  </a:schemeClr>
+                </a:solidFill>
+                <a:latin typeface="Palatino" pitchFamily="2" charset="77"/>
+                <a:ea typeface="Palatino" pitchFamily="2" charset="77"/>
+              </a:rPr>
+              <a:t>50 buyers </a:t>
+            </a:r>
+            <a:r>
+              <a:rPr lang="en-IT" dirty="0">
+                <a:solidFill>
+                  <a:schemeClr val="bg1">
+                    <a:lumMod val="50000"/>
+                  </a:schemeClr>
+                </a:solidFill>
+                <a:latin typeface="Palatino" pitchFamily="2" charset="77"/>
+                <a:ea typeface="Palatino" pitchFamily="2" charset="77"/>
+              </a:rPr>
+              <a:t>per each product, each with valuations similarly to R1</a:t>
+            </a:r>
+          </a:p>
+          <a:p>
+            <a:endParaRPr lang="en-IT" sz="2400" dirty="0">
+              <a:latin typeface="Palatino" pitchFamily="2" charset="77"/>
+              <a:ea typeface="Palatino" pitchFamily="2" charset="77"/>
+            </a:endParaRPr>
+          </a:p>
+          <a:p>
+            <a:pPr>
+              <a:spcAft>
+                <a:spcPts val="1200"/>
+              </a:spcAft>
+            </a:pPr>
+            <a:r>
+              <a:rPr lang="en-IT" sz="2400" dirty="0">
+                <a:latin typeface="Palatino" pitchFamily="2" charset="77"/>
+                <a:ea typeface="Palatino" pitchFamily="2" charset="77"/>
+              </a:rPr>
+              <a:t>Changes</a:t>
+            </a:r>
+          </a:p>
+          <a:p>
+            <a:pPr>
+              <a:spcAft>
+                <a:spcPts val="1200"/>
+              </a:spcAft>
+            </a:pPr>
+            <a:r>
+              <a:rPr lang="en-IT" dirty="0">
+                <a:solidFill>
+                  <a:schemeClr val="bg1">
+                    <a:lumMod val="50000"/>
+                  </a:schemeClr>
+                </a:solidFill>
+                <a:latin typeface="Palatino" pitchFamily="2" charset="77"/>
+                <a:ea typeface="Palatino" pitchFamily="2" charset="77"/>
+              </a:rPr>
+              <a:t>We extended the environment to a multi-product environment, that is equivalent to N independent single-product environments</a:t>
+            </a:r>
+          </a:p>
+          <a:p>
+            <a:endParaRPr lang="en-IT" sz="2400" dirty="0">
+              <a:solidFill>
+                <a:schemeClr val="bg1">
+                  <a:lumMod val="50000"/>
+                </a:schemeClr>
+              </a:solidFill>
+              <a:latin typeface="Palatino" pitchFamily="2" charset="77"/>
+              <a:ea typeface="Palatino" pitchFamily="2" charset="77"/>
+            </a:endParaRPr>
+          </a:p>
+        </p:txBody>
+      </p:sp>
+    </p:spTree>
+    <p:extLst>
+      <p:ext uri="{BB962C8B-B14F-4D97-AF65-F5344CB8AC3E}">
+        <p14:creationId xmlns:p14="http://schemas.microsoft.com/office/powerpoint/2010/main" val="3124452071"/>
+      </p:ext>
+    </p:extLst>
+  </p:cSld>
+  <p:clrMapOvr>
+    <a:masterClrMapping/>
+  </p:clrMapOvr>
+</p:sld>
+</file>
+
+<file path=ppt/slides/slide23.xml><?xml version="1.0" encoding="utf-8"?>
+<p:sld xmlns:a="http://schemas.openxmlformats.org/drawingml/2006/main" xmlns:r="http://schemas.openxmlformats.org/officeDocument/2006/relationships" xmlns:p="http://schemas.openxmlformats.org/presentationml/2006/main">
+  <p:cSld>
+    <p:spTree>
+      <p:nvGrpSpPr>
+        <p:cNvPr id="1" name="">
+          <a:extLst>
+            <a:ext uri="{FF2B5EF4-FFF2-40B4-BE49-F238E27FC236}">
+              <a16:creationId xmlns:a16="http://schemas.microsoft.com/office/drawing/2014/main" id="{2FACD19F-D667-1176-B1D3-0A09DEDDAA33}"/>
+            </a:ext>
+          </a:extLst>
+        </p:cNvPr>
+        <p:cNvGrpSpPr/>
+        <p:nvPr/>
+      </p:nvGrpSpPr>
+      <p:grpSpPr>
+        <a:xfrm>
+          <a:off x="0" y="0"/>
+          <a:ext cx="0" cy="0"/>
+          <a:chOff x="0" y="0"/>
+          <a:chExt cx="0" cy="0"/>
+        </a:xfrm>
+      </p:grpSpPr>
+      <p:sp>
+        <p:nvSpPr>
+          <p:cNvPr id="2" name="Title 1">
+            <a:extLst>
+              <a:ext uri="{FF2B5EF4-FFF2-40B4-BE49-F238E27FC236}">
+                <a16:creationId xmlns:a16="http://schemas.microsoft.com/office/drawing/2014/main" id="{83FCFB76-DA18-65E8-EFDD-8C004E464004}"/>
+              </a:ext>
+            </a:extLst>
+          </p:cNvPr>
+          <p:cNvSpPr>
+            <a:spLocks noGrp="1"/>
+          </p:cNvSpPr>
+          <p:nvPr>
+            <p:ph type="title"/>
+          </p:nvPr>
+        </p:nvSpPr>
+        <p:spPr/>
+        <p:txBody>
+          <a:bodyPr/>
+          <a:lstStyle/>
+          <a:p>
+            <a:r>
+              <a:rPr lang="en-IT" dirty="0">
+                <a:latin typeface="Palatino" pitchFamily="2" charset="77"/>
+                <a:ea typeface="Palatino" pitchFamily="2" charset="77"/>
+              </a:rPr>
+              <a:t>Feedback</a:t>
+            </a:r>
+          </a:p>
+        </p:txBody>
+      </p:sp>
+      <p:sp>
+        <p:nvSpPr>
+          <p:cNvPr id="5" name="TextBox 4">
+            <a:extLst>
+              <a:ext uri="{FF2B5EF4-FFF2-40B4-BE49-F238E27FC236}">
+                <a16:creationId xmlns:a16="http://schemas.microsoft.com/office/drawing/2014/main" id="{20FD5E5F-34CB-A231-AD05-0FC956512054}"/>
+              </a:ext>
+            </a:extLst>
+          </p:cNvPr>
+          <p:cNvSpPr txBox="1"/>
+          <p:nvPr/>
+        </p:nvSpPr>
+        <p:spPr>
+          <a:xfrm>
+            <a:off x="838200" y="1690688"/>
+            <a:ext cx="8871857" cy="1169551"/>
+          </a:xfrm>
+          <a:prstGeom prst="rect">
+            <a:avLst/>
+          </a:prstGeom>
+          <a:noFill/>
+        </p:spPr>
+        <p:txBody>
+          <a:bodyPr wrap="square" rtlCol="0">
+            <a:spAutoFit/>
+          </a:bodyPr>
+          <a:lstStyle/>
+          <a:p>
+            <a:pPr>
+              <a:spcAft>
+                <a:spcPts val="1200"/>
+              </a:spcAft>
+            </a:pPr>
+            <a:r>
+              <a:rPr lang="en-IT" sz="2400" dirty="0">
+                <a:latin typeface="Palatino" pitchFamily="2" charset="77"/>
+                <a:ea typeface="Palatino" pitchFamily="2" charset="77"/>
+              </a:rPr>
+              <a:t>Assumptions</a:t>
+            </a:r>
+            <a:endParaRPr lang="en-IT" sz="1600" dirty="0">
+              <a:latin typeface="Palatino" pitchFamily="2" charset="77"/>
+              <a:ea typeface="Palatino" pitchFamily="2" charset="77"/>
+            </a:endParaRPr>
+          </a:p>
+          <a:p>
+            <a:r>
+              <a:rPr lang="en-IT" dirty="0">
+                <a:solidFill>
+                  <a:schemeClr val="bg1">
+                    <a:lumMod val="50000"/>
+                  </a:schemeClr>
+                </a:solidFill>
+                <a:latin typeface="Palatino" pitchFamily="2" charset="77"/>
+                <a:ea typeface="Palatino" pitchFamily="2" charset="77"/>
+              </a:rPr>
+              <a:t>The environment returns the </a:t>
+            </a:r>
+            <a:r>
+              <a:rPr lang="en-IT" i="1" dirty="0">
+                <a:solidFill>
+                  <a:schemeClr val="bg1">
+                    <a:lumMod val="50000"/>
+                  </a:schemeClr>
+                </a:solidFill>
+                <a:latin typeface="Palatino" pitchFamily="2" charset="77"/>
+                <a:ea typeface="Palatino" pitchFamily="2" charset="77"/>
+              </a:rPr>
+              <a:t>number of sales per product </a:t>
+            </a:r>
+            <a:r>
+              <a:rPr lang="en-IT" dirty="0">
+                <a:solidFill>
+                  <a:schemeClr val="bg1">
+                    <a:lumMod val="50000"/>
+                  </a:schemeClr>
+                </a:solidFill>
+                <a:latin typeface="Palatino" pitchFamily="2" charset="77"/>
+                <a:ea typeface="Palatino" pitchFamily="2" charset="77"/>
+              </a:rPr>
+              <a:t>and the </a:t>
+            </a:r>
+            <a:r>
+              <a:rPr lang="en-IT" i="1" dirty="0">
+                <a:solidFill>
+                  <a:schemeClr val="bg1">
+                    <a:lumMod val="50000"/>
+                  </a:schemeClr>
+                </a:solidFill>
+                <a:latin typeface="Palatino" pitchFamily="2" charset="77"/>
+                <a:ea typeface="Palatino" pitchFamily="2" charset="77"/>
+              </a:rPr>
+              <a:t>reward per product</a:t>
+            </a:r>
+            <a:r>
+              <a:rPr lang="en-IT" dirty="0">
+                <a:solidFill>
+                  <a:schemeClr val="bg1">
+                    <a:lumMod val="50000"/>
+                  </a:schemeClr>
+                </a:solidFill>
+                <a:latin typeface="Palatino" pitchFamily="2" charset="77"/>
+                <a:ea typeface="Palatino" pitchFamily="2" charset="77"/>
+              </a:rPr>
+              <a:t>, along with the </a:t>
+            </a:r>
+            <a:r>
+              <a:rPr lang="en-IT" i="1" dirty="0">
+                <a:solidFill>
+                  <a:schemeClr val="bg1">
+                    <a:lumMod val="50000"/>
+                  </a:schemeClr>
+                </a:solidFill>
+                <a:latin typeface="Palatino" pitchFamily="2" charset="77"/>
+                <a:ea typeface="Palatino" pitchFamily="2" charset="77"/>
+              </a:rPr>
+              <a:t>total reward</a:t>
+            </a:r>
+          </a:p>
+        </p:txBody>
+      </p:sp>
+    </p:spTree>
+    <p:extLst>
+      <p:ext uri="{BB962C8B-B14F-4D97-AF65-F5344CB8AC3E}">
+        <p14:creationId xmlns:p14="http://schemas.microsoft.com/office/powerpoint/2010/main" val="682064687"/>
+      </p:ext>
+    </p:extLst>
+  </p:cSld>
+  <p:clrMapOvr>
+    <a:masterClrMapping/>
+  </p:clrMapOvr>
+</p:sld>
+</file>
+
+<file path=ppt/slides/slide24.xml><?xml version="1.0" encoding="utf-8"?>
+<p:sld xmlns:a="http://schemas.openxmlformats.org/drawingml/2006/main" xmlns:r="http://schemas.openxmlformats.org/officeDocument/2006/relationships" xmlns:p="http://schemas.openxmlformats.org/presentationml/2006/main">
+  <p:cSld>
+    <p:spTree>
+      <p:nvGrpSpPr>
+        <p:cNvPr id="1" name="">
+          <a:extLst>
+            <a:ext uri="{FF2B5EF4-FFF2-40B4-BE49-F238E27FC236}">
+              <a16:creationId xmlns:a16="http://schemas.microsoft.com/office/drawing/2014/main" id="{33DF982F-ECEE-8F13-30C3-4DB9A2C0B2F1}"/>
+            </a:ext>
+          </a:extLst>
+        </p:cNvPr>
+        <p:cNvGrpSpPr/>
+        <p:nvPr/>
+      </p:nvGrpSpPr>
+      <p:grpSpPr>
+        <a:xfrm>
+          <a:off x="0" y="0"/>
+          <a:ext cx="0" cy="0"/>
+          <a:chOff x="0" y="0"/>
+          <a:chExt cx="0" cy="0"/>
+        </a:xfrm>
+      </p:grpSpPr>
+      <p:sp>
+        <p:nvSpPr>
+          <p:cNvPr id="2" name="Title 1">
+            <a:extLst>
+              <a:ext uri="{FF2B5EF4-FFF2-40B4-BE49-F238E27FC236}">
+                <a16:creationId xmlns:a16="http://schemas.microsoft.com/office/drawing/2014/main" id="{DF57348D-881D-3E02-703F-0D79E500D06D}"/>
+              </a:ext>
+            </a:extLst>
+          </p:cNvPr>
+          <p:cNvSpPr>
+            <a:spLocks noGrp="1"/>
+          </p:cNvSpPr>
+          <p:nvPr>
+            <p:ph type="title"/>
+          </p:nvPr>
+        </p:nvSpPr>
+        <p:spPr/>
+        <p:txBody>
+          <a:bodyPr/>
+          <a:lstStyle/>
+          <a:p>
+            <a:r>
+              <a:rPr lang="en-IT" dirty="0">
+                <a:latin typeface="Palatino" pitchFamily="2" charset="77"/>
+                <a:ea typeface="Palatino" pitchFamily="2" charset="77"/>
+              </a:rPr>
+              <a:t>Strategy</a:t>
+            </a:r>
+          </a:p>
+        </p:txBody>
+      </p:sp>
+      <p:sp>
+        <p:nvSpPr>
+          <p:cNvPr id="3" name="Content Placeholder 2">
+            <a:extLst>
+              <a:ext uri="{FF2B5EF4-FFF2-40B4-BE49-F238E27FC236}">
+                <a16:creationId xmlns:a16="http://schemas.microsoft.com/office/drawing/2014/main" id="{9AD61C98-A0F3-8623-53B4-B947A5CB0E3D}"/>
+              </a:ext>
+            </a:extLst>
+          </p:cNvPr>
+          <p:cNvSpPr>
+            <a:spLocks noGrp="1"/>
+          </p:cNvSpPr>
+          <p:nvPr>
+            <p:ph idx="1"/>
+          </p:nvPr>
+        </p:nvSpPr>
+        <p:spPr>
+          <a:xfrm>
+            <a:off x="838199" y="1668322"/>
+            <a:ext cx="10850697" cy="4368921"/>
+          </a:xfrm>
+        </p:spPr>
+        <p:txBody>
+          <a:bodyPr>
+            <a:noAutofit/>
+          </a:bodyPr>
+          <a:lstStyle/>
+          <a:p>
+            <a:pPr marL="0" indent="0">
+              <a:spcBef>
+                <a:spcPts val="0"/>
+              </a:spcBef>
+              <a:spcAft>
+                <a:spcPts val="1200"/>
+              </a:spcAft>
+              <a:buNone/>
+            </a:pPr>
+            <a:r>
+              <a:rPr lang="en-GB" sz="2400">
+                <a:latin typeface="Palatino" pitchFamily="2" charset="77"/>
+                <a:ea typeface="Palatino" pitchFamily="2" charset="77"/>
+              </a:rPr>
+              <a:t>Estimation</a:t>
+            </a:r>
+          </a:p>
+          <a:p>
+            <a:pPr marL="0" indent="0">
+              <a:spcBef>
+                <a:spcPts val="0"/>
+              </a:spcBef>
+              <a:spcAft>
+                <a:spcPts val="1200"/>
+              </a:spcAft>
+              <a:buNone/>
+            </a:pPr>
+            <a:endParaRPr lang="en-GB" sz="1600" dirty="0">
+              <a:latin typeface="Palatino" pitchFamily="2" charset="77"/>
+              <a:ea typeface="Palatino" pitchFamily="2" charset="77"/>
+            </a:endParaRPr>
+          </a:p>
+          <a:p>
+            <a:pPr marL="0" indent="0">
+              <a:spcBef>
+                <a:spcPts val="0"/>
+              </a:spcBef>
+              <a:spcAft>
+                <a:spcPts val="1200"/>
+              </a:spcAft>
+              <a:buNone/>
+            </a:pPr>
+            <a:r>
+              <a:rPr lang="en-GB" sz="2400" dirty="0">
+                <a:latin typeface="Palatino" pitchFamily="2" charset="77"/>
+                <a:ea typeface="Palatino" pitchFamily="2" charset="77"/>
+              </a:rPr>
+              <a:t>Decision</a:t>
+            </a:r>
+          </a:p>
+          <a:p>
+            <a:pPr marL="0" indent="0">
+              <a:spcBef>
+                <a:spcPts val="0"/>
+              </a:spcBef>
+              <a:spcAft>
+                <a:spcPts val="1200"/>
+              </a:spcAft>
+              <a:buNone/>
+            </a:pPr>
+            <a:endParaRPr lang="en-IT" sz="1200" dirty="0">
+              <a:solidFill>
+                <a:schemeClr val="bg1">
+                  <a:lumMod val="50000"/>
+                </a:schemeClr>
+              </a:solidFill>
+              <a:latin typeface="Palatino" pitchFamily="2" charset="77"/>
+              <a:ea typeface="Palatino" pitchFamily="2" charset="77"/>
+            </a:endParaRPr>
+          </a:p>
+        </p:txBody>
+      </p:sp>
+    </p:spTree>
+    <p:extLst>
+      <p:ext uri="{BB962C8B-B14F-4D97-AF65-F5344CB8AC3E}">
+        <p14:creationId xmlns:p14="http://schemas.microsoft.com/office/powerpoint/2010/main" val="2316898954"/>
+      </p:ext>
+    </p:extLst>
+  </p:cSld>
+  <p:clrMapOvr>
+    <a:masterClrMapping/>
+  </p:clrMapOvr>
+</p:sld>
+</file>
+
+<file path=ppt/slides/slide25.xml><?xml version="1.0" encoding="utf-8"?>
+<p:sld xmlns:a="http://schemas.openxmlformats.org/drawingml/2006/main" xmlns:r="http://schemas.openxmlformats.org/officeDocument/2006/relationships" xmlns:p="http://schemas.openxmlformats.org/presentationml/2006/main">
+  <p:cSld>
+    <p:spTree>
+      <p:nvGrpSpPr>
+        <p:cNvPr id="1" name="">
+          <a:extLst>
+            <a:ext uri="{FF2B5EF4-FFF2-40B4-BE49-F238E27FC236}">
+              <a16:creationId xmlns:a16="http://schemas.microsoft.com/office/drawing/2014/main" id="{814FD57A-30F1-243E-E03F-E2F6F1D3B304}"/>
+            </a:ext>
+          </a:extLst>
+        </p:cNvPr>
+        <p:cNvGrpSpPr/>
+        <p:nvPr/>
+      </p:nvGrpSpPr>
+      <p:grpSpPr>
+        <a:xfrm>
+          <a:off x="0" y="0"/>
+          <a:ext cx="0" cy="0"/>
+          <a:chOff x="0" y="0"/>
+          <a:chExt cx="0" cy="0"/>
+        </a:xfrm>
+      </p:grpSpPr>
+      <p:sp>
+        <p:nvSpPr>
+          <p:cNvPr id="2" name="Title 1">
+            <a:extLst>
+              <a:ext uri="{FF2B5EF4-FFF2-40B4-BE49-F238E27FC236}">
+                <a16:creationId xmlns:a16="http://schemas.microsoft.com/office/drawing/2014/main" id="{8A70F0DC-94E3-E287-90E3-6ABA304D70B0}"/>
+              </a:ext>
+            </a:extLst>
+          </p:cNvPr>
+          <p:cNvSpPr>
+            <a:spLocks noGrp="1"/>
+          </p:cNvSpPr>
+          <p:nvPr>
+            <p:ph type="title"/>
+          </p:nvPr>
+        </p:nvSpPr>
+        <p:spPr/>
+        <p:txBody>
+          <a:bodyPr/>
+          <a:lstStyle/>
+          <a:p>
+            <a:r>
+              <a:rPr lang="en-IT" dirty="0">
+                <a:latin typeface="Palatino" pitchFamily="2" charset="77"/>
+                <a:ea typeface="Palatino" pitchFamily="2" charset="77"/>
+              </a:rPr>
+              <a:t>Strategy</a:t>
+            </a:r>
+          </a:p>
+        </p:txBody>
+      </p:sp>
+      <p:sp>
+        <p:nvSpPr>
+          <p:cNvPr id="3" name="Content Placeholder 2">
+            <a:extLst>
+              <a:ext uri="{FF2B5EF4-FFF2-40B4-BE49-F238E27FC236}">
+                <a16:creationId xmlns:a16="http://schemas.microsoft.com/office/drawing/2014/main" id="{0EDF4CDC-3BA4-9658-08D2-D583319A135B}"/>
+              </a:ext>
+            </a:extLst>
+          </p:cNvPr>
+          <p:cNvSpPr>
+            <a:spLocks noGrp="1"/>
+          </p:cNvSpPr>
+          <p:nvPr>
+            <p:ph idx="1"/>
+          </p:nvPr>
+        </p:nvSpPr>
+        <p:spPr>
+          <a:xfrm>
+            <a:off x="838200" y="1668322"/>
+            <a:ext cx="8816163" cy="3254552"/>
+          </a:xfrm>
+        </p:spPr>
+        <p:txBody>
+          <a:bodyPr>
+            <a:noAutofit/>
+          </a:bodyPr>
+          <a:lstStyle/>
+          <a:p>
+            <a:pPr marL="0" indent="0">
+              <a:spcBef>
+                <a:spcPts val="0"/>
+              </a:spcBef>
+              <a:spcAft>
+                <a:spcPts val="1200"/>
+              </a:spcAft>
+              <a:buNone/>
+            </a:pPr>
+            <a:r>
+              <a:rPr lang="it-IT" sz="2400" dirty="0">
+                <a:latin typeface="Palatino" pitchFamily="2" charset="77"/>
+                <a:ea typeface="Palatino" pitchFamily="2" charset="77"/>
+              </a:rPr>
+              <a:t>Idea</a:t>
+            </a:r>
+          </a:p>
+        </p:txBody>
+      </p:sp>
+    </p:spTree>
+    <p:extLst>
+      <p:ext uri="{BB962C8B-B14F-4D97-AF65-F5344CB8AC3E}">
+        <p14:creationId xmlns:p14="http://schemas.microsoft.com/office/powerpoint/2010/main" val="2926944955"/>
       </p:ext>
     </p:extLst>
   </p:cSld>
@@ -8509,7 +10492,7 @@
         <p:spPr>
           <a:xfrm>
             <a:off x="838200" y="1690688"/>
-            <a:ext cx="10786242" cy="923330"/>
+            <a:ext cx="10786242" cy="2323713"/>
           </a:xfrm>
           <a:prstGeom prst="rect">
             <a:avLst/>
@@ -8540,6 +10523,11 @@
             </a:endParaRPr>
           </a:p>
           <a:p>
+            <a:pPr>
+              <a:spcAft>
+                <a:spcPts val="600"/>
+              </a:spcAft>
+            </a:pPr>
             <a:r>
               <a:rPr lang="en-IT" dirty="0">
                 <a:solidFill>
@@ -8550,7 +10538,7 @@
                 <a:latin typeface="Palatino" pitchFamily="2" charset="77"/>
                 <a:ea typeface="Palatino" pitchFamily="2" charset="77"/>
               </a:rPr>
-              <a:t>We assume </a:t>
+              <a:t>The environment returns the </a:t>
             </a:r>
             <a:r>
               <a:rPr lang="en-IT" i="1" dirty="0">
@@ -8562,7 +10550,127 @@
                 <a:latin typeface="Palatino" pitchFamily="2" charset="77"/>
                 <a:ea typeface="Palatino" pitchFamily="2" charset="77"/>
               </a:rPr>
-              <a:t>bandit feedback</a:t>
+              <a:t>number of sales </a:t>
+            </a:r>
+            <a:r>
+              <a:rPr lang="en-IT" dirty="0">
+                <a:solidFill>
+                  <a:schemeClr val="bg1">
+                    <a:lumMod val="50000"/>
+                  </a:schemeClr>
+                </a:solidFill>
+                <a:latin typeface="Palatino" pitchFamily="2" charset="77"/>
+                <a:ea typeface="Palatino" pitchFamily="2" charset="77"/>
+              </a:rPr>
+              <a:t>along with the </a:t>
+            </a:r>
+            <a:r>
+              <a:rPr lang="en-IT" i="1" dirty="0">
+                <a:solidFill>
+                  <a:schemeClr val="bg1">
+                    <a:lumMod val="50000"/>
+                  </a:schemeClr>
+                </a:solidFill>
+                <a:latin typeface="Palatino" pitchFamily="2" charset="77"/>
+                <a:ea typeface="Palatino" pitchFamily="2" charset="77"/>
+              </a:rPr>
+              <a:t>reward</a:t>
+            </a:r>
+          </a:p>
+          <a:p>
+            <a:pPr>
+              <a:spcAft>
+                <a:spcPts val="600"/>
+              </a:spcAft>
+            </a:pPr>
+            <a:endParaRPr lang="en-IT" i="1" dirty="0">
+              <a:solidFill>
+                <a:schemeClr val="bg1">
+                  <a:lumMod val="50000"/>
+                </a:schemeClr>
+              </a:solidFill>
+              <a:latin typeface="Palatino" pitchFamily="2" charset="77"/>
+              <a:ea typeface="Palatino" pitchFamily="2" charset="77"/>
+            </a:endParaRPr>
+          </a:p>
+          <a:p>
+            <a:pPr>
+              <a:spcAft>
+                <a:spcPts val="600"/>
+              </a:spcAft>
+            </a:pPr>
+            <a:r>
+              <a:rPr lang="en-IT" sz="2400" dirty="0">
+                <a:latin typeface="Palatino" pitchFamily="2" charset="77"/>
+                <a:ea typeface="Palatino" pitchFamily="2" charset="77"/>
+              </a:rPr>
+              <a:t>Reward range</a:t>
+            </a:r>
+          </a:p>
+          <a:p>
+            <a:pPr>
+              <a:spcAft>
+                <a:spcPts val="600"/>
+              </a:spcAft>
+            </a:pPr>
+            <a:r>
+              <a:rPr lang="en-IT" dirty="0">
+                <a:solidFill>
+                  <a:schemeClr val="bg1">
+                    <a:lumMod val="50000"/>
+                  </a:schemeClr>
+                </a:solidFill>
+                <a:latin typeface="Palatino" pitchFamily="2" charset="77"/>
+                <a:ea typeface="Palatino" pitchFamily="2" charset="77"/>
+              </a:rPr>
+              <a:t>We </a:t>
+            </a:r>
+            <a:r>
+              <a:rPr lang="en-IT" i="1" dirty="0">
+                <a:solidFill>
+                  <a:schemeClr val="bg1">
+                    <a:lumMod val="50000"/>
+                  </a:schemeClr>
+                </a:solidFill>
+                <a:latin typeface="Palatino" pitchFamily="2" charset="77"/>
+                <a:ea typeface="Palatino" pitchFamily="2" charset="77"/>
+              </a:rPr>
+              <a:t>did not normalize the reward</a:t>
+            </a:r>
+            <a:r>
+              <a:rPr lang="en-IT" dirty="0">
+                <a:solidFill>
+                  <a:schemeClr val="bg1">
+                    <a:lumMod val="50000"/>
+                  </a:schemeClr>
+                </a:solidFill>
+                <a:latin typeface="Palatino" pitchFamily="2" charset="77"/>
+                <a:ea typeface="Palatino" pitchFamily="2" charset="77"/>
+              </a:rPr>
+              <a:t> into [0, 1] interval</a:t>
+            </a:r>
+            <a:br>
+              <a:rPr lang="en-IT" dirty="0">
+                <a:solidFill>
+                  <a:schemeClr val="bg1">
+                    <a:lumMod val="50000"/>
+                  </a:schemeClr>
+                </a:solidFill>
+                <a:latin typeface="Palatino" pitchFamily="2" charset="77"/>
+                <a:ea typeface="Palatino" pitchFamily="2" charset="77"/>
+              </a:rPr>
+            </a:br>
+            <a:r>
+              <a:rPr lang="en-IT" sz="1400" dirty="0">
+                <a:solidFill>
+                  <a:schemeClr val="bg1">
+                    <a:lumMod val="50000"/>
+                  </a:schemeClr>
+                </a:solidFill>
+                <a:latin typeface="Palatino" pitchFamily="2" charset="77"/>
+                <a:ea typeface="Palatino" pitchFamily="2" charset="77"/>
+              </a:rPr>
+              <a:t>That implies adjusting the confidence bounds accordingly</a:t>
             </a:r>
             <a:endParaRPr lang="en-IT" dirty="0">
               <a:solidFill>
@@ -8996,18 +11104,15 @@
               </a:rPr>
               <a:t>pseudo-regret</a:t>
             </a:r>
-            <a:r>
-              <a:rPr lang="en-IT" sz="1800" dirty="0">
-                <a:solidFill>
-                  <a:schemeClr val="bg1">
-                    <a:lumMod val="50000"/>
-                  </a:schemeClr>
-                </a:solidFill>
-                <a:latin typeface="Palatino" pitchFamily="2" charset="77"/>
-                <a:ea typeface="Palatino" pitchFamily="2" charset="77"/>
-              </a:rPr>
-              <a:t>.</a:t>
-            </a:r>
+            <a:endParaRPr lang="en-IT" sz="1800" dirty="0">
+              <a:solidFill>
+                <a:schemeClr val="bg1">
+                  <a:lumMod val="50000"/>
+                </a:schemeClr>
+              </a:solidFill>
+              <a:latin typeface="Palatino" pitchFamily="2" charset="77"/>
+              <a:ea typeface="Palatino" pitchFamily="2" charset="77"/>
+            </a:endParaRPr>
           </a:p>
         </p:txBody>
       </p:sp>
@@ -9192,7 +11297,7 @@
                 <a:latin typeface="Palatino" pitchFamily="2" charset="77"/>
                 <a:ea typeface="Palatino" pitchFamily="2" charset="77"/>
               </a:rPr>
-              <a:t>Here we plot instantaneous regret for UCB1 and Follow the Leader. They’re the same… Almost.</a:t>
+              <a:t>Here we plot instantaneous regret for UCB1 and Follow the Leader. They’re the same… Almost</a:t>
             </a:r>
           </a:p>
         </p:txBody>

</xml_diff>

<commit_message>
I will never open R1 and R2 again in my life
</commit_message>
<xml_diff>
--- a/Slides.pptx
+++ b/Slides.pptx
@@ -5,7 +5,7 @@
     <p:sldMasterId id="2147483648" r:id="rId1"/>
   </p:sldMasterIdLst>
   <p:notesMasterIdLst>
-    <p:notesMasterId r:id="rId33"/>
+    <p:notesMasterId r:id="rId34"/>
   </p:notesMasterIdLst>
   <p:sldIdLst>
     <p:sldId id="256" r:id="rId2"/>
@@ -39,6 +39,7 @@
     <p:sldId id="291" r:id="rId30"/>
     <p:sldId id="293" r:id="rId31"/>
     <p:sldId id="294" r:id="rId32"/>
+    <p:sldId id="295" r:id="rId33"/>
   </p:sldIdLst>
   <p:sldSz cx="12192000" cy="6858000"/>
   <p:notesSz cx="6858000" cy="9144000"/>
@@ -173,6 +174,7 @@
             <p14:sldId id="291"/>
             <p14:sldId id="293"/>
             <p14:sldId id="294"/>
+            <p14:sldId id="295"/>
           </p14:sldIdLst>
         </p14:section>
       </p14:sectionLst>
@@ -5068,8 +5070,8 @@
           </a:p>
         </p:txBody>
       </p:sp>
-      <mc:AlternateContent xmlns:mc="http://schemas.openxmlformats.org/markup-compatibility/2006">
-        <mc:Choice xmlns:a14="http://schemas.microsoft.com/office/drawing/2010/main" Requires="a14">
+      <mc:AlternateContent xmlns:mc="http://schemas.openxmlformats.org/markup-compatibility/2006" xmlns:a14="http://schemas.microsoft.com/office/drawing/2010/main">
+        <mc:Choice Requires="a14">
           <p:sp>
             <p:nvSpPr>
               <p:cNvPr id="3" name="Content Placeholder 2">
@@ -5604,7 +5606,7 @@
             </p:txBody>
           </p:sp>
         </mc:Choice>
-        <mc:Fallback>
+        <mc:Fallback xmlns="">
           <p:sp>
             <p:nvSpPr>
               <p:cNvPr id="3" name="Content Placeholder 2">
@@ -7176,8 +7178,8 @@
           </a:p>
         </p:txBody>
       </p:sp>
-      <mc:AlternateContent xmlns:mc="http://schemas.openxmlformats.org/markup-compatibility/2006">
-        <mc:Choice xmlns:a14="http://schemas.microsoft.com/office/drawing/2010/main" Requires="a14">
+      <mc:AlternateContent xmlns:mc="http://schemas.openxmlformats.org/markup-compatibility/2006" xmlns:a14="http://schemas.microsoft.com/office/drawing/2010/main">
+        <mc:Choice Requires="a14">
           <p:sp>
             <p:nvSpPr>
               <p:cNvPr id="5" name="TextBox 4">
@@ -7783,7 +7785,7 @@
             </p:txBody>
           </p:sp>
         </mc:Choice>
-        <mc:Fallback>
+        <mc:Fallback xmlns="">
           <p:sp>
             <p:nvSpPr>
               <p:cNvPr id="5" name="TextBox 4">
@@ -8313,10 +8315,10 @@
       </p:sp>
       <p:pic>
         <p:nvPicPr>
-          <p:cNvPr id="7" name="Picture 6">
+          <p:cNvPr id="3" name="Picture 2">
             <a:extLst>
               <a:ext uri="{FF2B5EF4-FFF2-40B4-BE49-F238E27FC236}">
-                <a16:creationId xmlns:a16="http://schemas.microsoft.com/office/drawing/2014/main" id="{283AA7C5-7190-E0C4-0693-3AFC466CBE9E}"/>
+                <a16:creationId xmlns:a16="http://schemas.microsoft.com/office/drawing/2014/main" id="{836BD81E-7AD0-2926-22E7-947EDD3EB97C}"/>
               </a:ext>
             </a:extLst>
           </p:cNvPr>
@@ -8333,8 +8335,8 @@
         </p:blipFill>
         <p:spPr>
           <a:xfrm>
-            <a:off x="872913" y="2314746"/>
-            <a:ext cx="10446173" cy="3529461"/>
+            <a:off x="1101700" y="2416629"/>
+            <a:ext cx="9988600" cy="3374860"/>
           </a:xfrm>
           <a:prstGeom prst="rect">
             <a:avLst/>
@@ -8798,8 +8800,8 @@
           </a:p>
         </p:txBody>
       </p:sp>
-      <mc:AlternateContent xmlns:mc="http://schemas.openxmlformats.org/markup-compatibility/2006">
-        <mc:Choice xmlns:a14="http://schemas.microsoft.com/office/drawing/2010/main" Requires="a14">
+      <mc:AlternateContent xmlns:mc="http://schemas.openxmlformats.org/markup-compatibility/2006" xmlns:a14="http://schemas.microsoft.com/office/drawing/2010/main">
+        <mc:Choice Requires="a14">
           <p:sp>
             <p:nvSpPr>
               <p:cNvPr id="3" name="Content Placeholder 2">
@@ -9423,7 +9425,7 @@
             </p:txBody>
           </p:sp>
         </mc:Choice>
-        <mc:Fallback>
+        <mc:Fallback xmlns="">
           <p:sp>
             <p:nvSpPr>
               <p:cNvPr id="3" name="Content Placeholder 2">
@@ -10527,8 +10529,8 @@
           </a:p>
         </p:txBody>
       </p:sp>
-      <mc:AlternateContent xmlns:mc="http://schemas.openxmlformats.org/markup-compatibility/2006">
-        <mc:Choice xmlns:a14="http://schemas.microsoft.com/office/drawing/2010/main" Requires="a14">
+      <mc:AlternateContent xmlns:mc="http://schemas.openxmlformats.org/markup-compatibility/2006" xmlns:a14="http://schemas.microsoft.com/office/drawing/2010/main">
+        <mc:Choice Requires="a14">
           <p:sp>
             <p:nvSpPr>
               <p:cNvPr id="7" name="Content Placeholder 2">
@@ -10966,7 +10968,7 @@
             </p:txBody>
           </p:sp>
         </mc:Choice>
-        <mc:Fallback>
+        <mc:Fallback xmlns="">
           <p:sp>
             <p:nvSpPr>
               <p:cNvPr id="7" name="Content Placeholder 2">
@@ -11661,8 +11663,8 @@
           </a:p>
         </p:txBody>
       </p:sp>
-      <mc:AlternateContent xmlns:mc="http://schemas.openxmlformats.org/markup-compatibility/2006">
-        <mc:Choice xmlns:a14="http://schemas.microsoft.com/office/drawing/2010/main" Requires="a14">
+      <mc:AlternateContent xmlns:mc="http://schemas.openxmlformats.org/markup-compatibility/2006" xmlns:a14="http://schemas.microsoft.com/office/drawing/2010/main">
+        <mc:Choice Requires="a14">
           <p:sp>
             <p:nvSpPr>
               <p:cNvPr id="3" name="Content Placeholder 2">
@@ -12231,7 +12233,7 @@
             </p:txBody>
           </p:sp>
         </mc:Choice>
-        <mc:Fallback>
+        <mc:Fallback xmlns="">
           <p:sp>
             <p:nvSpPr>
               <p:cNvPr id="3" name="Content Placeholder 2">
@@ -12427,8 +12429,8 @@
           </a:p>
         </p:txBody>
       </p:sp>
-      <mc:AlternateContent xmlns:mc="http://schemas.openxmlformats.org/markup-compatibility/2006" xmlns:a14="http://schemas.microsoft.com/office/drawing/2010/main">
-        <mc:Choice Requires="a14">
+      <mc:AlternateContent xmlns:mc="http://schemas.openxmlformats.org/markup-compatibility/2006">
+        <mc:Choice xmlns:a14="http://schemas.microsoft.com/office/drawing/2010/main" Requires="a14">
           <p:sp>
             <p:nvSpPr>
               <p:cNvPr id="5" name="TextBox 4">
@@ -12444,7 +12446,7 @@
             <p:spPr>
               <a:xfrm>
                 <a:off x="838200" y="1690688"/>
-                <a:ext cx="10786242" cy="3077766"/>
+                <a:ext cx="10786242" cy="3908762"/>
               </a:xfrm>
               <a:prstGeom prst="rect">
                 <a:avLst/>
@@ -12915,10 +12917,250 @@
                   <a:ea typeface="Palatino" pitchFamily="2" charset="77"/>
                 </a:endParaRPr>
               </a:p>
+              <a:p>
+                <a:endParaRPr lang="en-IT" i="1" dirty="0">
+                  <a:solidFill>
+                    <a:schemeClr val="bg1">
+                      <a:lumMod val="50000"/>
+                    </a:schemeClr>
+                  </a:solidFill>
+                  <a:latin typeface="Palatino" pitchFamily="2" charset="77"/>
+                  <a:ea typeface="Palatino" pitchFamily="2" charset="77"/>
+                </a:endParaRPr>
+              </a:p>
+              <a:p>
+                <a:r>
+                  <a:rPr lang="it-IT" sz="1200" dirty="0">
+                    <a:solidFill>
+                      <a:schemeClr val="bg1">
+                        <a:lumMod val="50000"/>
+                      </a:schemeClr>
+                    </a:solidFill>
+                    <a:latin typeface="Palatino" pitchFamily="2" charset="77"/>
+                    <a:ea typeface="Palatino" pitchFamily="2" charset="77"/>
+                  </a:rPr>
+                  <a:t>Disclaimer: The price </a:t>
+                </a:r>
+                <a:r>
+                  <a:rPr lang="it-IT" sz="1200" dirty="0" err="1">
+                    <a:solidFill>
+                      <a:schemeClr val="bg1">
+                        <a:lumMod val="50000"/>
+                      </a:schemeClr>
+                    </a:solidFill>
+                    <a:latin typeface="Palatino" pitchFamily="2" charset="77"/>
+                    <a:ea typeface="Palatino" pitchFamily="2" charset="77"/>
+                  </a:rPr>
+                  <a:t>grids</a:t>
+                </a:r>
+                <a:r>
+                  <a:rPr lang="it-IT" sz="1200" dirty="0">
+                    <a:solidFill>
+                      <a:schemeClr val="bg1">
+                        <a:lumMod val="50000"/>
+                      </a:schemeClr>
+                    </a:solidFill>
+                    <a:latin typeface="Palatino" pitchFamily="2" charset="77"/>
+                    <a:ea typeface="Palatino" pitchFamily="2" charset="77"/>
+                  </a:rPr>
+                  <a:t> </a:t>
+                </a:r>
+                <a:r>
+                  <a:rPr lang="it-IT" sz="1200" dirty="0" err="1">
+                    <a:solidFill>
+                      <a:schemeClr val="bg1">
+                        <a:lumMod val="50000"/>
+                      </a:schemeClr>
+                    </a:solidFill>
+                    <a:latin typeface="Palatino" pitchFamily="2" charset="77"/>
+                    <a:ea typeface="Palatino" pitchFamily="2" charset="77"/>
+                  </a:rPr>
+                  <a:t>were</a:t>
+                </a:r>
+                <a:r>
+                  <a:rPr lang="it-IT" sz="1200" dirty="0">
+                    <a:solidFill>
+                      <a:schemeClr val="bg1">
+                        <a:lumMod val="50000"/>
+                      </a:schemeClr>
+                    </a:solidFill>
+                    <a:latin typeface="Palatino" pitchFamily="2" charset="77"/>
+                    <a:ea typeface="Palatino" pitchFamily="2" charset="77"/>
+                  </a:rPr>
+                  <a:t> </a:t>
+                </a:r>
+                <a:r>
+                  <a:rPr lang="it-IT" sz="1200" dirty="0" err="1">
+                    <a:solidFill>
+                      <a:schemeClr val="bg1">
+                        <a:lumMod val="50000"/>
+                      </a:schemeClr>
+                    </a:solidFill>
+                    <a:latin typeface="Palatino" pitchFamily="2" charset="77"/>
+                    <a:ea typeface="Palatino" pitchFamily="2" charset="77"/>
+                  </a:rPr>
+                  <a:t>often</a:t>
+                </a:r>
+                <a:r>
+                  <a:rPr lang="it-IT" sz="1200" dirty="0">
+                    <a:solidFill>
+                      <a:schemeClr val="bg1">
+                        <a:lumMod val="50000"/>
+                      </a:schemeClr>
+                    </a:solidFill>
+                    <a:latin typeface="Palatino" pitchFamily="2" charset="77"/>
+                    <a:ea typeface="Palatino" pitchFamily="2" charset="77"/>
+                  </a:rPr>
+                  <a:t> set </a:t>
+                </a:r>
+                <a:r>
+                  <a:rPr lang="it-IT" sz="1200" i="1" dirty="0" err="1">
+                    <a:solidFill>
+                      <a:schemeClr val="bg1">
+                        <a:lumMod val="50000"/>
+                      </a:schemeClr>
+                    </a:solidFill>
+                    <a:latin typeface="Palatino" pitchFamily="2" charset="77"/>
+                    <a:ea typeface="Palatino" pitchFamily="2" charset="77"/>
+                  </a:rPr>
+                  <a:t>very</a:t>
+                </a:r>
+                <a:r>
+                  <a:rPr lang="it-IT" sz="1200" i="1" dirty="0">
+                    <a:solidFill>
+                      <a:schemeClr val="bg1">
+                        <a:lumMod val="50000"/>
+                      </a:schemeClr>
+                    </a:solidFill>
+                    <a:latin typeface="Palatino" pitchFamily="2" charset="77"/>
+                    <a:ea typeface="Palatino" pitchFamily="2" charset="77"/>
+                  </a:rPr>
+                  <a:t>-discrete </a:t>
+                </a:r>
+                <a:r>
+                  <a:rPr lang="it-IT" sz="1200" dirty="0">
+                    <a:solidFill>
+                      <a:schemeClr val="bg1">
+                        <a:lumMod val="50000"/>
+                      </a:schemeClr>
+                    </a:solidFill>
+                    <a:latin typeface="Palatino" pitchFamily="2" charset="77"/>
+                    <a:ea typeface="Palatino" pitchFamily="2" charset="77"/>
+                  </a:rPr>
+                  <a:t>for </a:t>
+                </a:r>
+                <a:r>
+                  <a:rPr lang="it-IT" sz="1200" dirty="0" err="1">
+                    <a:solidFill>
+                      <a:schemeClr val="bg1">
+                        <a:lumMod val="50000"/>
+                      </a:schemeClr>
+                    </a:solidFill>
+                    <a:latin typeface="Palatino" pitchFamily="2" charset="77"/>
+                    <a:ea typeface="Palatino" pitchFamily="2" charset="77"/>
+                  </a:rPr>
+                  <a:t>computational</a:t>
+                </a:r>
+                <a:r>
+                  <a:rPr lang="it-IT" sz="1200" dirty="0">
+                    <a:solidFill>
+                      <a:schemeClr val="bg1">
+                        <a:lumMod val="50000"/>
+                      </a:schemeClr>
+                    </a:solidFill>
+                    <a:latin typeface="Palatino" pitchFamily="2" charset="77"/>
+                    <a:ea typeface="Palatino" pitchFamily="2" charset="77"/>
+                  </a:rPr>
+                  <a:t> </a:t>
+                </a:r>
+                <a:r>
+                  <a:rPr lang="it-IT" sz="1200" dirty="0" err="1">
+                    <a:solidFill>
+                      <a:schemeClr val="bg1">
+                        <a:lumMod val="50000"/>
+                      </a:schemeClr>
+                    </a:solidFill>
+                    <a:latin typeface="Palatino" pitchFamily="2" charset="77"/>
+                    <a:ea typeface="Palatino" pitchFamily="2" charset="77"/>
+                  </a:rPr>
+                  <a:t>means</a:t>
+                </a:r>
+                <a:r>
+                  <a:rPr lang="it-IT" sz="1200" dirty="0">
+                    <a:solidFill>
+                      <a:schemeClr val="bg1">
+                        <a:lumMod val="50000"/>
+                      </a:schemeClr>
+                    </a:solidFill>
+                    <a:latin typeface="Palatino" pitchFamily="2" charset="77"/>
+                    <a:ea typeface="Palatino" pitchFamily="2" charset="77"/>
+                  </a:rPr>
+                  <a:t>, </a:t>
+                </a:r>
+                <a:r>
+                  <a:rPr lang="it-IT" sz="1200" dirty="0" err="1">
+                    <a:solidFill>
+                      <a:schemeClr val="bg1">
+                        <a:lumMod val="50000"/>
+                      </a:schemeClr>
+                    </a:solidFill>
+                    <a:latin typeface="Palatino" pitchFamily="2" charset="77"/>
+                    <a:ea typeface="Palatino" pitchFamily="2" charset="77"/>
+                  </a:rPr>
+                  <a:t>accordingly</a:t>
+                </a:r>
+                <a:r>
+                  <a:rPr lang="it-IT" sz="1200" dirty="0">
+                    <a:solidFill>
+                      <a:schemeClr val="bg1">
+                        <a:lumMod val="50000"/>
+                      </a:schemeClr>
+                    </a:solidFill>
+                    <a:latin typeface="Palatino" pitchFamily="2" charset="77"/>
+                    <a:ea typeface="Palatino" pitchFamily="2" charset="77"/>
+                  </a:rPr>
+                  <a:t> to the project </a:t>
+                </a:r>
+                <a:r>
+                  <a:rPr lang="it-IT" sz="1200" dirty="0" err="1">
+                    <a:solidFill>
+                      <a:schemeClr val="bg1">
+                        <a:lumMod val="50000"/>
+                      </a:schemeClr>
+                    </a:solidFill>
+                    <a:latin typeface="Palatino" pitchFamily="2" charset="77"/>
+                    <a:ea typeface="Palatino" pitchFamily="2" charset="77"/>
+                  </a:rPr>
+                  <a:t>specifications</a:t>
+                </a:r>
+                <a:r>
+                  <a:rPr lang="it-IT" sz="1200" dirty="0">
+                    <a:solidFill>
+                      <a:schemeClr val="bg1">
+                        <a:lumMod val="50000"/>
+                      </a:schemeClr>
+                    </a:solidFill>
+                    <a:latin typeface="Palatino" pitchFamily="2" charset="77"/>
+                    <a:ea typeface="Palatino" pitchFamily="2" charset="77"/>
+                  </a:rPr>
+                  <a:t>.</a:t>
+                </a:r>
+              </a:p>
+              <a:p>
+                <a:endParaRPr lang="en-IT" i="1" dirty="0">
+                  <a:solidFill>
+                    <a:schemeClr val="bg1">
+                      <a:lumMod val="50000"/>
+                    </a:schemeClr>
+                  </a:solidFill>
+                  <a:latin typeface="Palatino" pitchFamily="2" charset="77"/>
+                  <a:ea typeface="Palatino" pitchFamily="2" charset="77"/>
+                </a:endParaRPr>
+              </a:p>
             </p:txBody>
           </p:sp>
         </mc:Choice>
-        <mc:Fallback xmlns="">
+        <mc:Fallback>
           <p:sp>
             <p:nvSpPr>
               <p:cNvPr id="5" name="TextBox 4">
@@ -12936,7 +13178,7 @@
             <p:spPr>
               <a:xfrm>
                 <a:off x="838200" y="1690688"/>
-                <a:ext cx="10786242" cy="3077766"/>
+                <a:ext cx="10786242" cy="3908762"/>
               </a:xfrm>
               <a:prstGeom prst="rect">
                 <a:avLst/>
@@ -12944,7 +13186,7 @@
               <a:blipFill>
                 <a:blip r:embed="rId3"/>
                 <a:stretch>
-                  <a:fillRect l="-941" t="-1230" b="-2459"/>
+                  <a:fillRect l="-941" t="-968"/>
                 </a:stretch>
               </a:blipFill>
             </p:spPr>
@@ -13030,8 +13272,8 @@
           </a:p>
         </p:txBody>
       </p:sp>
-      <mc:AlternateContent xmlns:mc="http://schemas.openxmlformats.org/markup-compatibility/2006">
-        <mc:Choice xmlns:a14="http://schemas.microsoft.com/office/drawing/2010/main" Requires="a14">
+      <mc:AlternateContent xmlns:mc="http://schemas.openxmlformats.org/markup-compatibility/2006" xmlns:a14="http://schemas.microsoft.com/office/drawing/2010/main">
+        <mc:Choice Requires="a14">
           <p:sp>
             <p:nvSpPr>
               <p:cNvPr id="3" name="Content Placeholder 2">
@@ -13463,7 +13705,7 @@
             </p:txBody>
           </p:sp>
         </mc:Choice>
-        <mc:Fallback>
+        <mc:Fallback xmlns="">
           <p:sp>
             <p:nvSpPr>
               <p:cNvPr id="3" name="Content Placeholder 2">
@@ -13875,6 +14117,114 @@
     <p:extLst>
       <p:ext uri="{BB962C8B-B14F-4D97-AF65-F5344CB8AC3E}">
         <p14:creationId xmlns:p14="http://schemas.microsoft.com/office/powerpoint/2010/main" val="2791515396"/>
+      </p:ext>
+    </p:extLst>
+  </p:cSld>
+  <p:clrMapOvr>
+    <a:masterClrMapping/>
+  </p:clrMapOvr>
+</p:sld>
+</file>
+
+<file path=ppt/slides/slide32.xml><?xml version="1.0" encoding="utf-8"?>
+<p:sld xmlns:a="http://schemas.openxmlformats.org/drawingml/2006/main" xmlns:r="http://schemas.openxmlformats.org/officeDocument/2006/relationships" xmlns:p="http://schemas.openxmlformats.org/presentationml/2006/main">
+  <p:cSld>
+    <p:spTree>
+      <p:nvGrpSpPr>
+        <p:cNvPr id="1" name="">
+          <a:extLst>
+            <a:ext uri="{FF2B5EF4-FFF2-40B4-BE49-F238E27FC236}">
+              <a16:creationId xmlns:a16="http://schemas.microsoft.com/office/drawing/2014/main" id="{8C39E343-F813-DB37-D823-CC97F0D9ACFD}"/>
+            </a:ext>
+          </a:extLst>
+        </p:cNvPr>
+        <p:cNvGrpSpPr/>
+        <p:nvPr/>
+      </p:nvGrpSpPr>
+      <p:grpSpPr>
+        <a:xfrm>
+          <a:off x="0" y="0"/>
+          <a:ext cx="0" cy="0"/>
+          <a:chOff x="0" y="0"/>
+          <a:chExt cx="0" cy="0"/>
+        </a:xfrm>
+      </p:grpSpPr>
+      <p:sp>
+        <p:nvSpPr>
+          <p:cNvPr id="2" name="Title 1">
+            <a:extLst>
+              <a:ext uri="{FF2B5EF4-FFF2-40B4-BE49-F238E27FC236}">
+                <a16:creationId xmlns:a16="http://schemas.microsoft.com/office/drawing/2014/main" id="{B60068CE-7573-35C8-D66A-EB0EE1F6F23D}"/>
+              </a:ext>
+            </a:extLst>
+          </p:cNvPr>
+          <p:cNvSpPr>
+            <a:spLocks noGrp="1"/>
+          </p:cNvSpPr>
+          <p:nvPr>
+            <p:ph type="title"/>
+          </p:nvPr>
+        </p:nvSpPr>
+        <p:spPr/>
+        <p:txBody>
+          <a:bodyPr/>
+          <a:lstStyle/>
+          <a:p>
+            <a:r>
+              <a:rPr lang="en-IT" dirty="0">
+                <a:latin typeface="Palatino" pitchFamily="2" charset="77"/>
+                <a:ea typeface="Palatino" pitchFamily="2" charset="77"/>
+              </a:rPr>
+              <a:t>Requirement 3</a:t>
+            </a:r>
+          </a:p>
+        </p:txBody>
+      </p:sp>
+      <p:sp>
+        <p:nvSpPr>
+          <p:cNvPr id="3" name="Text Placeholder 2">
+            <a:extLst>
+              <a:ext uri="{FF2B5EF4-FFF2-40B4-BE49-F238E27FC236}">
+                <a16:creationId xmlns:a16="http://schemas.microsoft.com/office/drawing/2014/main" id="{1DB6BAFB-972A-8102-30B0-115902D02E73}"/>
+              </a:ext>
+            </a:extLst>
+          </p:cNvPr>
+          <p:cNvSpPr>
+            <a:spLocks noGrp="1"/>
+          </p:cNvSpPr>
+          <p:nvPr>
+            <p:ph type="body" idx="1"/>
+          </p:nvPr>
+        </p:nvSpPr>
+        <p:spPr>
+          <a:xfrm>
+            <a:off x="831850" y="4799670"/>
+            <a:ext cx="10515600" cy="1500187"/>
+          </a:xfrm>
+        </p:spPr>
+        <p:txBody>
+          <a:bodyPr/>
+          <a:lstStyle/>
+          <a:p>
+            <a:r>
+              <a:rPr lang="en-IT" dirty="0">
+                <a:solidFill>
+                  <a:schemeClr val="bg1">
+                    <a:lumMod val="50000"/>
+                  </a:schemeClr>
+                </a:solidFill>
+                <a:latin typeface="Palatino" pitchFamily="2" charset="77"/>
+                <a:ea typeface="Palatino" pitchFamily="2" charset="77"/>
+              </a:rPr>
+              <a:t>With highly non-stationary environment</a:t>
+            </a:r>
+          </a:p>
+        </p:txBody>
+      </p:sp>
+    </p:spTree>
+    <p:extLst>
+      <p:ext uri="{BB962C8B-B14F-4D97-AF65-F5344CB8AC3E}">
+        <p14:creationId xmlns:p14="http://schemas.microsoft.com/office/powerpoint/2010/main" val="1955276177"/>
       </p:ext>
     </p:extLst>
   </p:cSld>
@@ -14041,8 +14391,8 @@
           </a:p>
         </p:txBody>
       </p:sp>
-      <mc:AlternateContent xmlns:mc="http://schemas.openxmlformats.org/markup-compatibility/2006">
-        <mc:Choice xmlns:a14="http://schemas.microsoft.com/office/drawing/2010/main" Requires="a14">
+      <mc:AlternateContent xmlns:mc="http://schemas.openxmlformats.org/markup-compatibility/2006" xmlns:a14="http://schemas.microsoft.com/office/drawing/2010/main">
+        <mc:Choice Requires="a14">
           <p:sp>
             <p:nvSpPr>
               <p:cNvPr id="5" name="TextBox 4">
@@ -15045,7 +15395,7 @@
             </p:txBody>
           </p:sp>
         </mc:Choice>
-        <mc:Fallback>
+        <mc:Fallback xmlns="">
           <p:sp>
             <p:nvSpPr>
               <p:cNvPr id="5" name="TextBox 4">
@@ -15157,8 +15507,8 @@
           </a:p>
         </p:txBody>
       </p:sp>
-      <mc:AlternateContent xmlns:mc="http://schemas.openxmlformats.org/markup-compatibility/2006">
-        <mc:Choice xmlns:a14="http://schemas.microsoft.com/office/drawing/2010/main" Requires="a14">
+      <mc:AlternateContent xmlns:mc="http://schemas.openxmlformats.org/markup-compatibility/2006" xmlns:a14="http://schemas.microsoft.com/office/drawing/2010/main">
+        <mc:Choice Requires="a14">
           <p:sp>
             <p:nvSpPr>
               <p:cNvPr id="5" name="TextBox 4">
@@ -15570,7 +15920,7 @@
             </p:txBody>
           </p:sp>
         </mc:Choice>
-        <mc:Fallback>
+        <mc:Fallback xmlns="">
           <p:sp>
             <p:nvSpPr>
               <p:cNvPr id="5" name="TextBox 4">

</xml_diff>